<commit_message>
[Compiler] added EOF handle function
</commit_message>
<xml_diff>
--- a/Compiler/Scanner/scan dfa.pptx
+++ b/Compiler/Scanner/scan dfa.pptx
@@ -2,12 +2,12 @@
 <file path=ppt/presentation.xml><?xml version="1.0" encoding="utf-8"?>
 <p:presentation xmlns:a="http://schemas.openxmlformats.org/drawingml/2006/main" xmlns:r="http://schemas.openxmlformats.org/officeDocument/2006/relationships" xmlns:p="http://schemas.openxmlformats.org/presentationml/2006/main" saveSubsetFonts="1">
   <p:sldMasterIdLst>
-    <p:sldMasterId id="2147483672" r:id="rId1"/>
+    <p:sldMasterId id="2147483684" r:id="rId1"/>
   </p:sldMasterIdLst>
   <p:sldIdLst>
     <p:sldId id="256" r:id="rId2"/>
   </p:sldIdLst>
-  <p:sldSz cx="6858000" cy="12960350"/>
+  <p:sldSz cx="7559675" cy="12960350"/>
   <p:notesSz cx="6858000" cy="9144000"/>
   <p:defaultTextStyle>
     <a:defPPr>
@@ -104,6 +104,11 @@
       </a:defRPr>
     </a:lvl9pPr>
   </p:defaultTextStyle>
+  <p:extLst>
+    <p:ext uri="{EFAFB233-063F-42B5-8137-9DF3F51BA10A}">
+      <p15:sldGuideLst xmlns:p15="http://schemas.microsoft.com/office/powerpoint/2012/main"/>
+    </p:ext>
+  </p:extLst>
 </p:presentation>
 </file>
 
@@ -136,15 +141,15 @@
         </p:nvSpPr>
         <p:spPr>
           <a:xfrm>
-            <a:off x="514350" y="2121058"/>
-            <a:ext cx="5829300" cy="4512122"/>
+            <a:off x="566976" y="2121058"/>
+            <a:ext cx="6425724" cy="4512122"/>
           </a:xfrm>
         </p:spPr>
         <p:txBody>
           <a:bodyPr anchor="b"/>
           <a:lstStyle>
             <a:lvl1pPr algn="ctr">
-              <a:defRPr sz="4500"/>
+              <a:defRPr sz="4960"/>
             </a:lvl1pPr>
           </a:lstStyle>
           <a:p>
@@ -168,8 +173,8 @@
         </p:nvSpPr>
         <p:spPr>
           <a:xfrm>
-            <a:off x="857250" y="6807185"/>
-            <a:ext cx="5143500" cy="3129084"/>
+            <a:off x="944960" y="6807185"/>
+            <a:ext cx="5669756" cy="3129084"/>
           </a:xfrm>
         </p:spPr>
         <p:txBody>
@@ -177,39 +182,39 @@
           <a:lstStyle>
             <a:lvl1pPr marL="0" indent="0" algn="ctr">
               <a:buNone/>
-              <a:defRPr sz="1800"/>
+              <a:defRPr sz="1984"/>
             </a:lvl1pPr>
-            <a:lvl2pPr marL="342900" indent="0" algn="ctr">
+            <a:lvl2pPr marL="377967" indent="0" algn="ctr">
               <a:buNone/>
-              <a:defRPr sz="1500"/>
+              <a:defRPr sz="1653"/>
             </a:lvl2pPr>
-            <a:lvl3pPr marL="685800" indent="0" algn="ctr">
+            <a:lvl3pPr marL="755934" indent="0" algn="ctr">
               <a:buNone/>
-              <a:defRPr sz="1350"/>
+              <a:defRPr sz="1488"/>
             </a:lvl3pPr>
-            <a:lvl4pPr marL="1028700" indent="0" algn="ctr">
+            <a:lvl4pPr marL="1133902" indent="0" algn="ctr">
               <a:buNone/>
-              <a:defRPr sz="1200"/>
+              <a:defRPr sz="1323"/>
             </a:lvl4pPr>
-            <a:lvl5pPr marL="1371600" indent="0" algn="ctr">
+            <a:lvl5pPr marL="1511869" indent="0" algn="ctr">
               <a:buNone/>
-              <a:defRPr sz="1200"/>
+              <a:defRPr sz="1323"/>
             </a:lvl5pPr>
-            <a:lvl6pPr marL="1714500" indent="0" algn="ctr">
+            <a:lvl6pPr marL="1889836" indent="0" algn="ctr">
               <a:buNone/>
-              <a:defRPr sz="1200"/>
+              <a:defRPr sz="1323"/>
             </a:lvl6pPr>
-            <a:lvl7pPr marL="2057400" indent="0" algn="ctr">
+            <a:lvl7pPr marL="2267803" indent="0" algn="ctr">
               <a:buNone/>
-              <a:defRPr sz="1200"/>
+              <a:defRPr sz="1323"/>
             </a:lvl7pPr>
-            <a:lvl8pPr marL="2400300" indent="0" algn="ctr">
+            <a:lvl8pPr marL="2645771" indent="0" algn="ctr">
               <a:buNone/>
-              <a:defRPr sz="1200"/>
+              <a:defRPr sz="1323"/>
             </a:lvl8pPr>
-            <a:lvl9pPr marL="2743200" indent="0" algn="ctr">
+            <a:lvl9pPr marL="3023738" indent="0" algn="ctr">
               <a:buNone/>
-              <a:defRPr sz="1200"/>
+              <a:defRPr sz="1323"/>
             </a:lvl9pPr>
           </a:lstStyle>
           <a:p>
@@ -238,7 +243,7 @@
           <a:p>
             <a:fld id="{667325C4-9761-4513-A997-61DB0BED67AF}" type="datetimeFigureOut">
               <a:rPr lang="ko-KR" altLang="en-US" smtClean="0"/>
-              <a:t>2022-04-13</a:t>
+              <a:t>2022-04-14</a:t>
             </a:fld>
             <a:endParaRPr lang="ko-KR" altLang="en-US"/>
           </a:p>
@@ -289,7 +294,7 @@
     </p:spTree>
     <p:extLst>
       <p:ext uri="{BB962C8B-B14F-4D97-AF65-F5344CB8AC3E}">
-        <p14:creationId xmlns:p14="http://schemas.microsoft.com/office/powerpoint/2010/main" val="1532858558"/>
+        <p14:creationId xmlns:p14="http://schemas.microsoft.com/office/powerpoint/2010/main" val="570368768"/>
       </p:ext>
     </p:extLst>
   </p:cSld>
@@ -408,7 +413,7 @@
           <a:p>
             <a:fld id="{667325C4-9761-4513-A997-61DB0BED67AF}" type="datetimeFigureOut">
               <a:rPr lang="ko-KR" altLang="en-US" smtClean="0"/>
-              <a:t>2022-04-13</a:t>
+              <a:t>2022-04-14</a:t>
             </a:fld>
             <a:endParaRPr lang="ko-KR" altLang="en-US"/>
           </a:p>
@@ -459,7 +464,7 @@
     </p:spTree>
     <p:extLst>
       <p:ext uri="{BB962C8B-B14F-4D97-AF65-F5344CB8AC3E}">
-        <p14:creationId xmlns:p14="http://schemas.microsoft.com/office/powerpoint/2010/main" val="2401203997"/>
+        <p14:creationId xmlns:p14="http://schemas.microsoft.com/office/powerpoint/2010/main" val="556903278"/>
       </p:ext>
     </p:extLst>
   </p:cSld>
@@ -498,8 +503,8 @@
         </p:nvSpPr>
         <p:spPr>
           <a:xfrm>
-            <a:off x="4907757" y="690018"/>
-            <a:ext cx="1478756" cy="10983298"/>
+            <a:off x="5409893" y="690018"/>
+            <a:ext cx="1630055" cy="10983298"/>
           </a:xfrm>
         </p:spPr>
         <p:txBody>
@@ -526,8 +531,8 @@
         </p:nvSpPr>
         <p:spPr>
           <a:xfrm>
-            <a:off x="471488" y="690018"/>
-            <a:ext cx="4350544" cy="10983298"/>
+            <a:off x="519728" y="690018"/>
+            <a:ext cx="4795669" cy="10983298"/>
           </a:xfrm>
         </p:spPr>
         <p:txBody>
@@ -588,7 +593,7 @@
           <a:p>
             <a:fld id="{667325C4-9761-4513-A997-61DB0BED67AF}" type="datetimeFigureOut">
               <a:rPr lang="ko-KR" altLang="en-US" smtClean="0"/>
-              <a:t>2022-04-13</a:t>
+              <a:t>2022-04-14</a:t>
             </a:fld>
             <a:endParaRPr lang="ko-KR" altLang="en-US"/>
           </a:p>
@@ -639,7 +644,7 @@
     </p:spTree>
     <p:extLst>
       <p:ext uri="{BB962C8B-B14F-4D97-AF65-F5344CB8AC3E}">
-        <p14:creationId xmlns:p14="http://schemas.microsoft.com/office/powerpoint/2010/main" val="3903999656"/>
+        <p14:creationId xmlns:p14="http://schemas.microsoft.com/office/powerpoint/2010/main" val="3876175251"/>
       </p:ext>
     </p:extLst>
   </p:cSld>
@@ -758,7 +763,7 @@
           <a:p>
             <a:fld id="{667325C4-9761-4513-A997-61DB0BED67AF}" type="datetimeFigureOut">
               <a:rPr lang="ko-KR" altLang="en-US" smtClean="0"/>
-              <a:t>2022-04-13</a:t>
+              <a:t>2022-04-14</a:t>
             </a:fld>
             <a:endParaRPr lang="ko-KR" altLang="en-US"/>
           </a:p>
@@ -809,7 +814,7 @@
     </p:spTree>
     <p:extLst>
       <p:ext uri="{BB962C8B-B14F-4D97-AF65-F5344CB8AC3E}">
-        <p14:creationId xmlns:p14="http://schemas.microsoft.com/office/powerpoint/2010/main" val="3269214041"/>
+        <p14:creationId xmlns:p14="http://schemas.microsoft.com/office/powerpoint/2010/main" val="3599993462"/>
       </p:ext>
     </p:extLst>
   </p:cSld>
@@ -848,15 +853,15 @@
         </p:nvSpPr>
         <p:spPr>
           <a:xfrm>
-            <a:off x="467916" y="3231091"/>
-            <a:ext cx="5915025" cy="5391145"/>
+            <a:off x="515791" y="3231091"/>
+            <a:ext cx="6520220" cy="5391145"/>
           </a:xfrm>
         </p:spPr>
         <p:txBody>
           <a:bodyPr anchor="b"/>
           <a:lstStyle>
             <a:lvl1pPr>
-              <a:defRPr sz="4500"/>
+              <a:defRPr sz="4960"/>
             </a:lvl1pPr>
           </a:lstStyle>
           <a:p>
@@ -880,8 +885,8 @@
         </p:nvSpPr>
         <p:spPr>
           <a:xfrm>
-            <a:off x="467916" y="8673238"/>
-            <a:ext cx="5915025" cy="2835076"/>
+            <a:off x="515791" y="8673238"/>
+            <a:ext cx="6520220" cy="2835076"/>
           </a:xfrm>
         </p:spPr>
         <p:txBody>
@@ -889,15 +894,15 @@
           <a:lstStyle>
             <a:lvl1pPr marL="0" indent="0">
               <a:buNone/>
-              <a:defRPr sz="1800">
+              <a:defRPr sz="1984">
                 <a:solidFill>
                   <a:schemeClr val="tx1"/>
                 </a:solidFill>
               </a:defRPr>
             </a:lvl1pPr>
-            <a:lvl2pPr marL="342900" indent="0">
+            <a:lvl2pPr marL="377967" indent="0">
               <a:buNone/>
-              <a:defRPr sz="1500">
+              <a:defRPr sz="1653">
                 <a:solidFill>
                   <a:schemeClr val="tx1">
                     <a:tint val="75000"/>
@@ -905,9 +910,9 @@
                 </a:solidFill>
               </a:defRPr>
             </a:lvl2pPr>
-            <a:lvl3pPr marL="685800" indent="0">
+            <a:lvl3pPr marL="755934" indent="0">
               <a:buNone/>
-              <a:defRPr sz="1350">
+              <a:defRPr sz="1488">
                 <a:solidFill>
                   <a:schemeClr val="tx1">
                     <a:tint val="75000"/>
@@ -915,9 +920,9 @@
                 </a:solidFill>
               </a:defRPr>
             </a:lvl3pPr>
-            <a:lvl4pPr marL="1028700" indent="0">
+            <a:lvl4pPr marL="1133902" indent="0">
               <a:buNone/>
-              <a:defRPr sz="1200">
+              <a:defRPr sz="1323">
                 <a:solidFill>
                   <a:schemeClr val="tx1">
                     <a:tint val="75000"/>
@@ -925,9 +930,9 @@
                 </a:solidFill>
               </a:defRPr>
             </a:lvl4pPr>
-            <a:lvl5pPr marL="1371600" indent="0">
+            <a:lvl5pPr marL="1511869" indent="0">
               <a:buNone/>
-              <a:defRPr sz="1200">
+              <a:defRPr sz="1323">
                 <a:solidFill>
                   <a:schemeClr val="tx1">
                     <a:tint val="75000"/>
@@ -935,9 +940,9 @@
                 </a:solidFill>
               </a:defRPr>
             </a:lvl5pPr>
-            <a:lvl6pPr marL="1714500" indent="0">
+            <a:lvl6pPr marL="1889836" indent="0">
               <a:buNone/>
-              <a:defRPr sz="1200">
+              <a:defRPr sz="1323">
                 <a:solidFill>
                   <a:schemeClr val="tx1">
                     <a:tint val="75000"/>
@@ -945,9 +950,9 @@
                 </a:solidFill>
               </a:defRPr>
             </a:lvl6pPr>
-            <a:lvl7pPr marL="2057400" indent="0">
+            <a:lvl7pPr marL="2267803" indent="0">
               <a:buNone/>
-              <a:defRPr sz="1200">
+              <a:defRPr sz="1323">
                 <a:solidFill>
                   <a:schemeClr val="tx1">
                     <a:tint val="75000"/>
@@ -955,9 +960,9 @@
                 </a:solidFill>
               </a:defRPr>
             </a:lvl7pPr>
-            <a:lvl8pPr marL="2400300" indent="0">
+            <a:lvl8pPr marL="2645771" indent="0">
               <a:buNone/>
-              <a:defRPr sz="1200">
+              <a:defRPr sz="1323">
                 <a:solidFill>
                   <a:schemeClr val="tx1">
                     <a:tint val="75000"/>
@@ -965,9 +970,9 @@
                 </a:solidFill>
               </a:defRPr>
             </a:lvl8pPr>
-            <a:lvl9pPr marL="2743200" indent="0">
+            <a:lvl9pPr marL="3023738" indent="0">
               <a:buNone/>
-              <a:defRPr sz="1200">
+              <a:defRPr sz="1323">
                 <a:solidFill>
                   <a:schemeClr val="tx1">
                     <a:tint val="75000"/>
@@ -1002,7 +1007,7 @@
           <a:p>
             <a:fld id="{667325C4-9761-4513-A997-61DB0BED67AF}" type="datetimeFigureOut">
               <a:rPr lang="ko-KR" altLang="en-US" smtClean="0"/>
-              <a:t>2022-04-13</a:t>
+              <a:t>2022-04-14</a:t>
             </a:fld>
             <a:endParaRPr lang="ko-KR" altLang="en-US"/>
           </a:p>
@@ -1053,7 +1058,7 @@
     </p:spTree>
     <p:extLst>
       <p:ext uri="{BB962C8B-B14F-4D97-AF65-F5344CB8AC3E}">
-        <p14:creationId xmlns:p14="http://schemas.microsoft.com/office/powerpoint/2010/main" val="3752225880"/>
+        <p14:creationId xmlns:p14="http://schemas.microsoft.com/office/powerpoint/2010/main" val="3128374220"/>
       </p:ext>
     </p:extLst>
   </p:cSld>
@@ -1115,8 +1120,8 @@
         </p:nvSpPr>
         <p:spPr>
           <a:xfrm>
-            <a:off x="471488" y="3450093"/>
-            <a:ext cx="2914650" cy="8223223"/>
+            <a:off x="519728" y="3450093"/>
+            <a:ext cx="3212862" cy="8223223"/>
           </a:xfrm>
         </p:spPr>
         <p:txBody>
@@ -1172,8 +1177,8 @@
         </p:nvSpPr>
         <p:spPr>
           <a:xfrm>
-            <a:off x="3471863" y="3450093"/>
-            <a:ext cx="2914650" cy="8223223"/>
+            <a:off x="3827085" y="3450093"/>
+            <a:ext cx="3212862" cy="8223223"/>
           </a:xfrm>
         </p:spPr>
         <p:txBody>
@@ -1234,7 +1239,7 @@
           <a:p>
             <a:fld id="{667325C4-9761-4513-A997-61DB0BED67AF}" type="datetimeFigureOut">
               <a:rPr lang="ko-KR" altLang="en-US" smtClean="0"/>
-              <a:t>2022-04-13</a:t>
+              <a:t>2022-04-14</a:t>
             </a:fld>
             <a:endParaRPr lang="ko-KR" altLang="en-US"/>
           </a:p>
@@ -1285,7 +1290,7 @@
     </p:spTree>
     <p:extLst>
       <p:ext uri="{BB962C8B-B14F-4D97-AF65-F5344CB8AC3E}">
-        <p14:creationId xmlns:p14="http://schemas.microsoft.com/office/powerpoint/2010/main" val="1142558339"/>
+        <p14:creationId xmlns:p14="http://schemas.microsoft.com/office/powerpoint/2010/main" val="151628539"/>
       </p:ext>
     </p:extLst>
   </p:cSld>
@@ -1324,8 +1329,8 @@
         </p:nvSpPr>
         <p:spPr>
           <a:xfrm>
-            <a:off x="472381" y="690021"/>
-            <a:ext cx="5915025" cy="2505069"/>
+            <a:off x="520712" y="690021"/>
+            <a:ext cx="6520220" cy="2505069"/>
           </a:xfrm>
         </p:spPr>
         <p:txBody>
@@ -1352,8 +1357,8 @@
         </p:nvSpPr>
         <p:spPr>
           <a:xfrm>
-            <a:off x="472381" y="3177087"/>
-            <a:ext cx="2901255" cy="1557041"/>
+            <a:off x="520713" y="3177087"/>
+            <a:ext cx="3198096" cy="1557041"/>
           </a:xfrm>
         </p:spPr>
         <p:txBody>
@@ -1361,39 +1366,39 @@
           <a:lstStyle>
             <a:lvl1pPr marL="0" indent="0">
               <a:buNone/>
-              <a:defRPr sz="1800" b="1"/>
+              <a:defRPr sz="1984" b="1"/>
             </a:lvl1pPr>
-            <a:lvl2pPr marL="342900" indent="0">
+            <a:lvl2pPr marL="377967" indent="0">
               <a:buNone/>
-              <a:defRPr sz="1500" b="1"/>
+              <a:defRPr sz="1653" b="1"/>
             </a:lvl2pPr>
-            <a:lvl3pPr marL="685800" indent="0">
+            <a:lvl3pPr marL="755934" indent="0">
               <a:buNone/>
-              <a:defRPr sz="1350" b="1"/>
+              <a:defRPr sz="1488" b="1"/>
             </a:lvl3pPr>
-            <a:lvl4pPr marL="1028700" indent="0">
+            <a:lvl4pPr marL="1133902" indent="0">
               <a:buNone/>
-              <a:defRPr sz="1200" b="1"/>
+              <a:defRPr sz="1323" b="1"/>
             </a:lvl4pPr>
-            <a:lvl5pPr marL="1371600" indent="0">
+            <a:lvl5pPr marL="1511869" indent="0">
               <a:buNone/>
-              <a:defRPr sz="1200" b="1"/>
+              <a:defRPr sz="1323" b="1"/>
             </a:lvl5pPr>
-            <a:lvl6pPr marL="1714500" indent="0">
+            <a:lvl6pPr marL="1889836" indent="0">
               <a:buNone/>
-              <a:defRPr sz="1200" b="1"/>
+              <a:defRPr sz="1323" b="1"/>
             </a:lvl6pPr>
-            <a:lvl7pPr marL="2057400" indent="0">
+            <a:lvl7pPr marL="2267803" indent="0">
               <a:buNone/>
-              <a:defRPr sz="1200" b="1"/>
+              <a:defRPr sz="1323" b="1"/>
             </a:lvl7pPr>
-            <a:lvl8pPr marL="2400300" indent="0">
+            <a:lvl8pPr marL="2645771" indent="0">
               <a:buNone/>
-              <a:defRPr sz="1200" b="1"/>
+              <a:defRPr sz="1323" b="1"/>
             </a:lvl8pPr>
-            <a:lvl9pPr marL="2743200" indent="0">
+            <a:lvl9pPr marL="3023738" indent="0">
               <a:buNone/>
-              <a:defRPr sz="1200" b="1"/>
+              <a:defRPr sz="1323" b="1"/>
             </a:lvl9pPr>
           </a:lstStyle>
           <a:p>
@@ -1417,8 +1422,8 @@
         </p:nvSpPr>
         <p:spPr>
           <a:xfrm>
-            <a:off x="472381" y="4734128"/>
-            <a:ext cx="2901255" cy="6963189"/>
+            <a:off x="520713" y="4734128"/>
+            <a:ext cx="3198096" cy="6963189"/>
           </a:xfrm>
         </p:spPr>
         <p:txBody>
@@ -1474,8 +1479,8 @@
         </p:nvSpPr>
         <p:spPr>
           <a:xfrm>
-            <a:off x="3471863" y="3177087"/>
-            <a:ext cx="2915543" cy="1557041"/>
+            <a:off x="3827086" y="3177087"/>
+            <a:ext cx="3213847" cy="1557041"/>
           </a:xfrm>
         </p:spPr>
         <p:txBody>
@@ -1483,39 +1488,39 @@
           <a:lstStyle>
             <a:lvl1pPr marL="0" indent="0">
               <a:buNone/>
-              <a:defRPr sz="1800" b="1"/>
+              <a:defRPr sz="1984" b="1"/>
             </a:lvl1pPr>
-            <a:lvl2pPr marL="342900" indent="0">
+            <a:lvl2pPr marL="377967" indent="0">
               <a:buNone/>
-              <a:defRPr sz="1500" b="1"/>
+              <a:defRPr sz="1653" b="1"/>
             </a:lvl2pPr>
-            <a:lvl3pPr marL="685800" indent="0">
+            <a:lvl3pPr marL="755934" indent="0">
               <a:buNone/>
-              <a:defRPr sz="1350" b="1"/>
+              <a:defRPr sz="1488" b="1"/>
             </a:lvl3pPr>
-            <a:lvl4pPr marL="1028700" indent="0">
+            <a:lvl4pPr marL="1133902" indent="0">
               <a:buNone/>
-              <a:defRPr sz="1200" b="1"/>
+              <a:defRPr sz="1323" b="1"/>
             </a:lvl4pPr>
-            <a:lvl5pPr marL="1371600" indent="0">
+            <a:lvl5pPr marL="1511869" indent="0">
               <a:buNone/>
-              <a:defRPr sz="1200" b="1"/>
+              <a:defRPr sz="1323" b="1"/>
             </a:lvl5pPr>
-            <a:lvl6pPr marL="1714500" indent="0">
+            <a:lvl6pPr marL="1889836" indent="0">
               <a:buNone/>
-              <a:defRPr sz="1200" b="1"/>
+              <a:defRPr sz="1323" b="1"/>
             </a:lvl6pPr>
-            <a:lvl7pPr marL="2057400" indent="0">
+            <a:lvl7pPr marL="2267803" indent="0">
               <a:buNone/>
-              <a:defRPr sz="1200" b="1"/>
+              <a:defRPr sz="1323" b="1"/>
             </a:lvl7pPr>
-            <a:lvl8pPr marL="2400300" indent="0">
+            <a:lvl8pPr marL="2645771" indent="0">
               <a:buNone/>
-              <a:defRPr sz="1200" b="1"/>
+              <a:defRPr sz="1323" b="1"/>
             </a:lvl8pPr>
-            <a:lvl9pPr marL="2743200" indent="0">
+            <a:lvl9pPr marL="3023738" indent="0">
               <a:buNone/>
-              <a:defRPr sz="1200" b="1"/>
+              <a:defRPr sz="1323" b="1"/>
             </a:lvl9pPr>
           </a:lstStyle>
           <a:p>
@@ -1539,8 +1544,8 @@
         </p:nvSpPr>
         <p:spPr>
           <a:xfrm>
-            <a:off x="3471863" y="4734128"/>
-            <a:ext cx="2915543" cy="6963189"/>
+            <a:off x="3827086" y="4734128"/>
+            <a:ext cx="3213847" cy="6963189"/>
           </a:xfrm>
         </p:spPr>
         <p:txBody>
@@ -1601,7 +1606,7 @@
           <a:p>
             <a:fld id="{667325C4-9761-4513-A997-61DB0BED67AF}" type="datetimeFigureOut">
               <a:rPr lang="ko-KR" altLang="en-US" smtClean="0"/>
-              <a:t>2022-04-13</a:t>
+              <a:t>2022-04-14</a:t>
             </a:fld>
             <a:endParaRPr lang="ko-KR" altLang="en-US"/>
           </a:p>
@@ -1652,7 +1657,7 @@
     </p:spTree>
     <p:extLst>
       <p:ext uri="{BB962C8B-B14F-4D97-AF65-F5344CB8AC3E}">
-        <p14:creationId xmlns:p14="http://schemas.microsoft.com/office/powerpoint/2010/main" val="3969417527"/>
+        <p14:creationId xmlns:p14="http://schemas.microsoft.com/office/powerpoint/2010/main" val="4081063057"/>
       </p:ext>
     </p:extLst>
   </p:cSld>
@@ -1719,7 +1724,7 @@
           <a:p>
             <a:fld id="{667325C4-9761-4513-A997-61DB0BED67AF}" type="datetimeFigureOut">
               <a:rPr lang="ko-KR" altLang="en-US" smtClean="0"/>
-              <a:t>2022-04-13</a:t>
+              <a:t>2022-04-14</a:t>
             </a:fld>
             <a:endParaRPr lang="ko-KR" altLang="en-US"/>
           </a:p>
@@ -1770,7 +1775,7 @@
     </p:spTree>
     <p:extLst>
       <p:ext uri="{BB962C8B-B14F-4D97-AF65-F5344CB8AC3E}">
-        <p14:creationId xmlns:p14="http://schemas.microsoft.com/office/powerpoint/2010/main" val="3136962099"/>
+        <p14:creationId xmlns:p14="http://schemas.microsoft.com/office/powerpoint/2010/main" val="1815464655"/>
       </p:ext>
     </p:extLst>
   </p:cSld>
@@ -1814,7 +1819,7 @@
           <a:p>
             <a:fld id="{667325C4-9761-4513-A997-61DB0BED67AF}" type="datetimeFigureOut">
               <a:rPr lang="ko-KR" altLang="en-US" smtClean="0"/>
-              <a:t>2022-04-13</a:t>
+              <a:t>2022-04-14</a:t>
             </a:fld>
             <a:endParaRPr lang="ko-KR" altLang="en-US"/>
           </a:p>
@@ -1865,7 +1870,7 @@
     </p:spTree>
     <p:extLst>
       <p:ext uri="{BB962C8B-B14F-4D97-AF65-F5344CB8AC3E}">
-        <p14:creationId xmlns:p14="http://schemas.microsoft.com/office/powerpoint/2010/main" val="67803097"/>
+        <p14:creationId xmlns:p14="http://schemas.microsoft.com/office/powerpoint/2010/main" val="2276565053"/>
       </p:ext>
     </p:extLst>
   </p:cSld>
@@ -1904,15 +1909,15 @@
         </p:nvSpPr>
         <p:spPr>
           <a:xfrm>
-            <a:off x="472381" y="864023"/>
-            <a:ext cx="2211884" cy="3024082"/>
+            <a:off x="520712" y="864023"/>
+            <a:ext cx="2438192" cy="3024082"/>
           </a:xfrm>
         </p:spPr>
         <p:txBody>
           <a:bodyPr anchor="b"/>
           <a:lstStyle>
             <a:lvl1pPr>
-              <a:defRPr sz="2400"/>
+              <a:defRPr sz="2645"/>
             </a:lvl1pPr>
           </a:lstStyle>
           <a:p>
@@ -1936,39 +1941,39 @@
         </p:nvSpPr>
         <p:spPr>
           <a:xfrm>
-            <a:off x="2915543" y="1866053"/>
-            <a:ext cx="3471863" cy="9210249"/>
+            <a:off x="3213847" y="1866053"/>
+            <a:ext cx="3827085" cy="9210249"/>
           </a:xfrm>
         </p:spPr>
         <p:txBody>
           <a:bodyPr/>
           <a:lstStyle>
             <a:lvl1pPr>
-              <a:defRPr sz="2400"/>
+              <a:defRPr sz="2645"/>
             </a:lvl1pPr>
             <a:lvl2pPr>
-              <a:defRPr sz="2100"/>
+              <a:defRPr sz="2315"/>
             </a:lvl2pPr>
             <a:lvl3pPr>
-              <a:defRPr sz="1800"/>
+              <a:defRPr sz="1984"/>
             </a:lvl3pPr>
             <a:lvl4pPr>
-              <a:defRPr sz="1500"/>
+              <a:defRPr sz="1653"/>
             </a:lvl4pPr>
             <a:lvl5pPr>
-              <a:defRPr sz="1500"/>
+              <a:defRPr sz="1653"/>
             </a:lvl5pPr>
             <a:lvl6pPr>
-              <a:defRPr sz="1500"/>
+              <a:defRPr sz="1653"/>
             </a:lvl6pPr>
             <a:lvl7pPr>
-              <a:defRPr sz="1500"/>
+              <a:defRPr sz="1653"/>
             </a:lvl7pPr>
             <a:lvl8pPr>
-              <a:defRPr sz="1500"/>
+              <a:defRPr sz="1653"/>
             </a:lvl8pPr>
             <a:lvl9pPr>
-              <a:defRPr sz="1500"/>
+              <a:defRPr sz="1653"/>
             </a:lvl9pPr>
           </a:lstStyle>
           <a:p>
@@ -2021,8 +2026,8 @@
         </p:nvSpPr>
         <p:spPr>
           <a:xfrm>
-            <a:off x="472381" y="3888105"/>
-            <a:ext cx="2211884" cy="7203195"/>
+            <a:off x="520712" y="3888105"/>
+            <a:ext cx="2438192" cy="7203195"/>
           </a:xfrm>
         </p:spPr>
         <p:txBody>
@@ -2030,39 +2035,39 @@
           <a:lstStyle>
             <a:lvl1pPr marL="0" indent="0">
               <a:buNone/>
-              <a:defRPr sz="1200"/>
+              <a:defRPr sz="1323"/>
             </a:lvl1pPr>
-            <a:lvl2pPr marL="342900" indent="0">
+            <a:lvl2pPr marL="377967" indent="0">
               <a:buNone/>
-              <a:defRPr sz="1050"/>
+              <a:defRPr sz="1157"/>
             </a:lvl2pPr>
-            <a:lvl3pPr marL="685800" indent="0">
+            <a:lvl3pPr marL="755934" indent="0">
               <a:buNone/>
-              <a:defRPr sz="900"/>
+              <a:defRPr sz="992"/>
             </a:lvl3pPr>
-            <a:lvl4pPr marL="1028700" indent="0">
+            <a:lvl4pPr marL="1133902" indent="0">
               <a:buNone/>
-              <a:defRPr sz="750"/>
+              <a:defRPr sz="827"/>
             </a:lvl4pPr>
-            <a:lvl5pPr marL="1371600" indent="0">
+            <a:lvl5pPr marL="1511869" indent="0">
               <a:buNone/>
-              <a:defRPr sz="750"/>
+              <a:defRPr sz="827"/>
             </a:lvl5pPr>
-            <a:lvl6pPr marL="1714500" indent="0">
+            <a:lvl6pPr marL="1889836" indent="0">
               <a:buNone/>
-              <a:defRPr sz="750"/>
+              <a:defRPr sz="827"/>
             </a:lvl6pPr>
-            <a:lvl7pPr marL="2057400" indent="0">
+            <a:lvl7pPr marL="2267803" indent="0">
               <a:buNone/>
-              <a:defRPr sz="750"/>
+              <a:defRPr sz="827"/>
             </a:lvl7pPr>
-            <a:lvl8pPr marL="2400300" indent="0">
+            <a:lvl8pPr marL="2645771" indent="0">
               <a:buNone/>
-              <a:defRPr sz="750"/>
+              <a:defRPr sz="827"/>
             </a:lvl8pPr>
-            <a:lvl9pPr marL="2743200" indent="0">
+            <a:lvl9pPr marL="3023738" indent="0">
               <a:buNone/>
-              <a:defRPr sz="750"/>
+              <a:defRPr sz="827"/>
             </a:lvl9pPr>
           </a:lstStyle>
           <a:p>
@@ -2091,7 +2096,7 @@
           <a:p>
             <a:fld id="{667325C4-9761-4513-A997-61DB0BED67AF}" type="datetimeFigureOut">
               <a:rPr lang="ko-KR" altLang="en-US" smtClean="0"/>
-              <a:t>2022-04-13</a:t>
+              <a:t>2022-04-14</a:t>
             </a:fld>
             <a:endParaRPr lang="ko-KR" altLang="en-US"/>
           </a:p>
@@ -2142,7 +2147,7 @@
     </p:spTree>
     <p:extLst>
       <p:ext uri="{BB962C8B-B14F-4D97-AF65-F5344CB8AC3E}">
-        <p14:creationId xmlns:p14="http://schemas.microsoft.com/office/powerpoint/2010/main" val="2013030928"/>
+        <p14:creationId xmlns:p14="http://schemas.microsoft.com/office/powerpoint/2010/main" val="3966015720"/>
       </p:ext>
     </p:extLst>
   </p:cSld>
@@ -2181,15 +2186,15 @@
         </p:nvSpPr>
         <p:spPr>
           <a:xfrm>
-            <a:off x="472381" y="864023"/>
-            <a:ext cx="2211884" cy="3024082"/>
+            <a:off x="520712" y="864023"/>
+            <a:ext cx="2438192" cy="3024082"/>
           </a:xfrm>
         </p:spPr>
         <p:txBody>
           <a:bodyPr anchor="b"/>
           <a:lstStyle>
             <a:lvl1pPr>
-              <a:defRPr sz="2400"/>
+              <a:defRPr sz="2645"/>
             </a:lvl1pPr>
           </a:lstStyle>
           <a:p>
@@ -2213,8 +2218,8 @@
         </p:nvSpPr>
         <p:spPr>
           <a:xfrm>
-            <a:off x="2915543" y="1866053"/>
-            <a:ext cx="3471863" cy="9210249"/>
+            <a:off x="3213847" y="1866053"/>
+            <a:ext cx="3827085" cy="9210249"/>
           </a:xfrm>
         </p:spPr>
         <p:txBody>
@@ -2222,39 +2227,39 @@
           <a:lstStyle>
             <a:lvl1pPr marL="0" indent="0">
               <a:buNone/>
-              <a:defRPr sz="2400"/>
+              <a:defRPr sz="2645"/>
             </a:lvl1pPr>
-            <a:lvl2pPr marL="342900" indent="0">
+            <a:lvl2pPr marL="377967" indent="0">
               <a:buNone/>
-              <a:defRPr sz="2100"/>
+              <a:defRPr sz="2315"/>
             </a:lvl2pPr>
-            <a:lvl3pPr marL="685800" indent="0">
+            <a:lvl3pPr marL="755934" indent="0">
               <a:buNone/>
-              <a:defRPr sz="1800"/>
+              <a:defRPr sz="1984"/>
             </a:lvl3pPr>
-            <a:lvl4pPr marL="1028700" indent="0">
+            <a:lvl4pPr marL="1133902" indent="0">
               <a:buNone/>
-              <a:defRPr sz="1500"/>
+              <a:defRPr sz="1653"/>
             </a:lvl4pPr>
-            <a:lvl5pPr marL="1371600" indent="0">
+            <a:lvl5pPr marL="1511869" indent="0">
               <a:buNone/>
-              <a:defRPr sz="1500"/>
+              <a:defRPr sz="1653"/>
             </a:lvl5pPr>
-            <a:lvl6pPr marL="1714500" indent="0">
+            <a:lvl6pPr marL="1889836" indent="0">
               <a:buNone/>
-              <a:defRPr sz="1500"/>
+              <a:defRPr sz="1653"/>
             </a:lvl6pPr>
-            <a:lvl7pPr marL="2057400" indent="0">
+            <a:lvl7pPr marL="2267803" indent="0">
               <a:buNone/>
-              <a:defRPr sz="1500"/>
+              <a:defRPr sz="1653"/>
             </a:lvl7pPr>
-            <a:lvl8pPr marL="2400300" indent="0">
+            <a:lvl8pPr marL="2645771" indent="0">
               <a:buNone/>
-              <a:defRPr sz="1500"/>
+              <a:defRPr sz="1653"/>
             </a:lvl8pPr>
-            <a:lvl9pPr marL="2743200" indent="0">
+            <a:lvl9pPr marL="3023738" indent="0">
               <a:buNone/>
-              <a:defRPr sz="1500"/>
+              <a:defRPr sz="1653"/>
             </a:lvl9pPr>
           </a:lstStyle>
           <a:p>
@@ -2278,8 +2283,8 @@
         </p:nvSpPr>
         <p:spPr>
           <a:xfrm>
-            <a:off x="472381" y="3888105"/>
-            <a:ext cx="2211884" cy="7203195"/>
+            <a:off x="520712" y="3888105"/>
+            <a:ext cx="2438192" cy="7203195"/>
           </a:xfrm>
         </p:spPr>
         <p:txBody>
@@ -2287,39 +2292,39 @@
           <a:lstStyle>
             <a:lvl1pPr marL="0" indent="0">
               <a:buNone/>
-              <a:defRPr sz="1200"/>
+              <a:defRPr sz="1323"/>
             </a:lvl1pPr>
-            <a:lvl2pPr marL="342900" indent="0">
+            <a:lvl2pPr marL="377967" indent="0">
               <a:buNone/>
-              <a:defRPr sz="1050"/>
+              <a:defRPr sz="1157"/>
             </a:lvl2pPr>
-            <a:lvl3pPr marL="685800" indent="0">
+            <a:lvl3pPr marL="755934" indent="0">
               <a:buNone/>
-              <a:defRPr sz="900"/>
+              <a:defRPr sz="992"/>
             </a:lvl3pPr>
-            <a:lvl4pPr marL="1028700" indent="0">
+            <a:lvl4pPr marL="1133902" indent="0">
               <a:buNone/>
-              <a:defRPr sz="750"/>
+              <a:defRPr sz="827"/>
             </a:lvl4pPr>
-            <a:lvl5pPr marL="1371600" indent="0">
+            <a:lvl5pPr marL="1511869" indent="0">
               <a:buNone/>
-              <a:defRPr sz="750"/>
+              <a:defRPr sz="827"/>
             </a:lvl5pPr>
-            <a:lvl6pPr marL="1714500" indent="0">
+            <a:lvl6pPr marL="1889836" indent="0">
               <a:buNone/>
-              <a:defRPr sz="750"/>
+              <a:defRPr sz="827"/>
             </a:lvl6pPr>
-            <a:lvl7pPr marL="2057400" indent="0">
+            <a:lvl7pPr marL="2267803" indent="0">
               <a:buNone/>
-              <a:defRPr sz="750"/>
+              <a:defRPr sz="827"/>
             </a:lvl7pPr>
-            <a:lvl8pPr marL="2400300" indent="0">
+            <a:lvl8pPr marL="2645771" indent="0">
               <a:buNone/>
-              <a:defRPr sz="750"/>
+              <a:defRPr sz="827"/>
             </a:lvl8pPr>
-            <a:lvl9pPr marL="2743200" indent="0">
+            <a:lvl9pPr marL="3023738" indent="0">
               <a:buNone/>
-              <a:defRPr sz="750"/>
+              <a:defRPr sz="827"/>
             </a:lvl9pPr>
           </a:lstStyle>
           <a:p>
@@ -2348,7 +2353,7 @@
           <a:p>
             <a:fld id="{667325C4-9761-4513-A997-61DB0BED67AF}" type="datetimeFigureOut">
               <a:rPr lang="ko-KR" altLang="en-US" smtClean="0"/>
-              <a:t>2022-04-13</a:t>
+              <a:t>2022-04-14</a:t>
             </a:fld>
             <a:endParaRPr lang="ko-KR" altLang="en-US"/>
           </a:p>
@@ -2399,7 +2404,7 @@
     </p:spTree>
     <p:extLst>
       <p:ext uri="{BB962C8B-B14F-4D97-AF65-F5344CB8AC3E}">
-        <p14:creationId xmlns:p14="http://schemas.microsoft.com/office/powerpoint/2010/main" val="2539190430"/>
+        <p14:creationId xmlns:p14="http://schemas.microsoft.com/office/powerpoint/2010/main" val="1392990797"/>
       </p:ext>
     </p:extLst>
   </p:cSld>
@@ -2443,8 +2448,8 @@
         </p:nvSpPr>
         <p:spPr>
           <a:xfrm>
-            <a:off x="471488" y="690021"/>
-            <a:ext cx="5915025" cy="2505069"/>
+            <a:off x="519728" y="690021"/>
+            <a:ext cx="6520220" cy="2505069"/>
           </a:xfrm>
           <a:prstGeom prst="rect">
             <a:avLst/>
@@ -2476,8 +2481,8 @@
         </p:nvSpPr>
         <p:spPr>
           <a:xfrm>
-            <a:off x="471488" y="3450093"/>
-            <a:ext cx="5915025" cy="8223223"/>
+            <a:off x="519728" y="3450093"/>
+            <a:ext cx="6520220" cy="8223223"/>
           </a:xfrm>
           <a:prstGeom prst="rect">
             <a:avLst/>
@@ -2538,8 +2543,8 @@
         </p:nvSpPr>
         <p:spPr>
           <a:xfrm>
-            <a:off x="471488" y="12012327"/>
-            <a:ext cx="1543050" cy="690019"/>
+            <a:off x="519728" y="12012327"/>
+            <a:ext cx="1700927" cy="690019"/>
           </a:xfrm>
           <a:prstGeom prst="rect">
             <a:avLst/>
@@ -2549,7 +2554,7 @@
           <a:bodyPr vert="horz" lIns="91440" tIns="45720" rIns="91440" bIns="45720" rtlCol="0" anchor="ctr"/>
           <a:lstStyle>
             <a:lvl1pPr algn="l">
-              <a:defRPr sz="900">
+              <a:defRPr sz="992">
                 <a:solidFill>
                   <a:schemeClr val="tx1">
                     <a:tint val="75000"/>
@@ -2561,7 +2566,7 @@
           <a:p>
             <a:fld id="{667325C4-9761-4513-A997-61DB0BED67AF}" type="datetimeFigureOut">
               <a:rPr lang="ko-KR" altLang="en-US" smtClean="0"/>
-              <a:t>2022-04-13</a:t>
+              <a:t>2022-04-14</a:t>
             </a:fld>
             <a:endParaRPr lang="ko-KR" altLang="en-US"/>
           </a:p>
@@ -2579,8 +2584,8 @@
         </p:nvSpPr>
         <p:spPr>
           <a:xfrm>
-            <a:off x="2271713" y="12012327"/>
-            <a:ext cx="2314575" cy="690019"/>
+            <a:off x="2504143" y="12012327"/>
+            <a:ext cx="2551390" cy="690019"/>
           </a:xfrm>
           <a:prstGeom prst="rect">
             <a:avLst/>
@@ -2590,7 +2595,7 @@
           <a:bodyPr vert="horz" lIns="91440" tIns="45720" rIns="91440" bIns="45720" rtlCol="0" anchor="ctr"/>
           <a:lstStyle>
             <a:lvl1pPr algn="ctr">
-              <a:defRPr sz="900">
+              <a:defRPr sz="992">
                 <a:solidFill>
                   <a:schemeClr val="tx1">
                     <a:tint val="75000"/>
@@ -2616,8 +2621,8 @@
         </p:nvSpPr>
         <p:spPr>
           <a:xfrm>
-            <a:off x="4843463" y="12012327"/>
-            <a:ext cx="1543050" cy="690019"/>
+            <a:off x="5339020" y="12012327"/>
+            <a:ext cx="1700927" cy="690019"/>
           </a:xfrm>
           <a:prstGeom prst="rect">
             <a:avLst/>
@@ -2627,7 +2632,7 @@
           <a:bodyPr vert="horz" lIns="91440" tIns="45720" rIns="91440" bIns="45720" rtlCol="0" anchor="ctr"/>
           <a:lstStyle>
             <a:lvl1pPr algn="r">
-              <a:defRPr sz="900">
+              <a:defRPr sz="992">
                 <a:solidFill>
                   <a:schemeClr val="tx1">
                     <a:tint val="75000"/>
@@ -2648,27 +2653,27 @@
     </p:spTree>
     <p:extLst>
       <p:ext uri="{BB962C8B-B14F-4D97-AF65-F5344CB8AC3E}">
-        <p14:creationId xmlns:p14="http://schemas.microsoft.com/office/powerpoint/2010/main" val="2194452122"/>
+        <p14:creationId xmlns:p14="http://schemas.microsoft.com/office/powerpoint/2010/main" val="3475628176"/>
       </p:ext>
     </p:extLst>
   </p:cSld>
   <p:clrMap bg1="lt1" tx1="dk1" bg2="lt2" tx2="dk2" accent1="accent1" accent2="accent2" accent3="accent3" accent4="accent4" accent5="accent5" accent6="accent6" hlink="hlink" folHlink="folHlink"/>
   <p:sldLayoutIdLst>
-    <p:sldLayoutId id="2147483673" r:id="rId1"/>
-    <p:sldLayoutId id="2147483674" r:id="rId2"/>
-    <p:sldLayoutId id="2147483675" r:id="rId3"/>
-    <p:sldLayoutId id="2147483676" r:id="rId4"/>
-    <p:sldLayoutId id="2147483677" r:id="rId5"/>
-    <p:sldLayoutId id="2147483678" r:id="rId6"/>
-    <p:sldLayoutId id="2147483679" r:id="rId7"/>
-    <p:sldLayoutId id="2147483680" r:id="rId8"/>
-    <p:sldLayoutId id="2147483681" r:id="rId9"/>
-    <p:sldLayoutId id="2147483682" r:id="rId10"/>
-    <p:sldLayoutId id="2147483683" r:id="rId11"/>
+    <p:sldLayoutId id="2147483685" r:id="rId1"/>
+    <p:sldLayoutId id="2147483686" r:id="rId2"/>
+    <p:sldLayoutId id="2147483687" r:id="rId3"/>
+    <p:sldLayoutId id="2147483688" r:id="rId4"/>
+    <p:sldLayoutId id="2147483689" r:id="rId5"/>
+    <p:sldLayoutId id="2147483690" r:id="rId6"/>
+    <p:sldLayoutId id="2147483691" r:id="rId7"/>
+    <p:sldLayoutId id="2147483692" r:id="rId8"/>
+    <p:sldLayoutId id="2147483693" r:id="rId9"/>
+    <p:sldLayoutId id="2147483694" r:id="rId10"/>
+    <p:sldLayoutId id="2147483695" r:id="rId11"/>
   </p:sldLayoutIdLst>
   <p:txStyles>
     <p:titleStyle>
-      <a:lvl1pPr algn="l" defTabSz="685800" rtl="0" eaLnBrk="1" latinLnBrk="1" hangingPunct="1">
+      <a:lvl1pPr algn="l" defTabSz="755934" rtl="0" eaLnBrk="1" latinLnBrk="1" hangingPunct="1">
         <a:lnSpc>
           <a:spcPct val="90000"/>
         </a:lnSpc>
@@ -2676,7 +2681,7 @@
           <a:spcPct val="0"/>
         </a:spcBef>
         <a:buNone/>
-        <a:defRPr sz="3300" kern="1200">
+        <a:defRPr sz="3637" kern="1200">
           <a:solidFill>
             <a:schemeClr val="tx1"/>
           </a:solidFill>
@@ -2687,16 +2692,16 @@
       </a:lvl1pPr>
     </p:titleStyle>
     <p:bodyStyle>
-      <a:lvl1pPr marL="171450" indent="-171450" algn="l" defTabSz="685800" rtl="0" eaLnBrk="1" latinLnBrk="1" hangingPunct="1">
+      <a:lvl1pPr marL="188984" indent="-188984" algn="l" defTabSz="755934" rtl="0" eaLnBrk="1" latinLnBrk="1" hangingPunct="1">
         <a:lnSpc>
           <a:spcPct val="90000"/>
         </a:lnSpc>
         <a:spcBef>
-          <a:spcPts val="750"/>
+          <a:spcPts val="827"/>
         </a:spcBef>
         <a:buFont typeface="Arial" panose="020B0604020202020204" pitchFamily="34" charset="0"/>
         <a:buChar char="•"/>
-        <a:defRPr sz="2100" kern="1200">
+        <a:defRPr sz="2315" kern="1200">
           <a:solidFill>
             <a:schemeClr val="tx1"/>
           </a:solidFill>
@@ -2705,16 +2710,16 @@
           <a:cs typeface="+mn-cs"/>
         </a:defRPr>
       </a:lvl1pPr>
-      <a:lvl2pPr marL="514350" indent="-171450" algn="l" defTabSz="685800" rtl="0" eaLnBrk="1" latinLnBrk="1" hangingPunct="1">
+      <a:lvl2pPr marL="566951" indent="-188984" algn="l" defTabSz="755934" rtl="0" eaLnBrk="1" latinLnBrk="1" hangingPunct="1">
         <a:lnSpc>
           <a:spcPct val="90000"/>
         </a:lnSpc>
         <a:spcBef>
-          <a:spcPts val="375"/>
+          <a:spcPts val="413"/>
         </a:spcBef>
         <a:buFont typeface="Arial" panose="020B0604020202020204" pitchFamily="34" charset="0"/>
         <a:buChar char="•"/>
-        <a:defRPr sz="1800" kern="1200">
+        <a:defRPr sz="1984" kern="1200">
           <a:solidFill>
             <a:schemeClr val="tx1"/>
           </a:solidFill>
@@ -2723,16 +2728,16 @@
           <a:cs typeface="+mn-cs"/>
         </a:defRPr>
       </a:lvl2pPr>
-      <a:lvl3pPr marL="857250" indent="-171450" algn="l" defTabSz="685800" rtl="0" eaLnBrk="1" latinLnBrk="1" hangingPunct="1">
+      <a:lvl3pPr marL="944918" indent="-188984" algn="l" defTabSz="755934" rtl="0" eaLnBrk="1" latinLnBrk="1" hangingPunct="1">
         <a:lnSpc>
           <a:spcPct val="90000"/>
         </a:lnSpc>
         <a:spcBef>
-          <a:spcPts val="375"/>
+          <a:spcPts val="413"/>
         </a:spcBef>
         <a:buFont typeface="Arial" panose="020B0604020202020204" pitchFamily="34" charset="0"/>
         <a:buChar char="•"/>
-        <a:defRPr sz="1500" kern="1200">
+        <a:defRPr sz="1653" kern="1200">
           <a:solidFill>
             <a:schemeClr val="tx1"/>
           </a:solidFill>
@@ -2741,16 +2746,16 @@
           <a:cs typeface="+mn-cs"/>
         </a:defRPr>
       </a:lvl3pPr>
-      <a:lvl4pPr marL="1200150" indent="-171450" algn="l" defTabSz="685800" rtl="0" eaLnBrk="1" latinLnBrk="1" hangingPunct="1">
+      <a:lvl4pPr marL="1322885" indent="-188984" algn="l" defTabSz="755934" rtl="0" eaLnBrk="1" latinLnBrk="1" hangingPunct="1">
         <a:lnSpc>
           <a:spcPct val="90000"/>
         </a:lnSpc>
         <a:spcBef>
-          <a:spcPts val="375"/>
+          <a:spcPts val="413"/>
         </a:spcBef>
         <a:buFont typeface="Arial" panose="020B0604020202020204" pitchFamily="34" charset="0"/>
         <a:buChar char="•"/>
-        <a:defRPr sz="1350" kern="1200">
+        <a:defRPr sz="1488" kern="1200">
           <a:solidFill>
             <a:schemeClr val="tx1"/>
           </a:solidFill>
@@ -2759,16 +2764,16 @@
           <a:cs typeface="+mn-cs"/>
         </a:defRPr>
       </a:lvl4pPr>
-      <a:lvl5pPr marL="1543050" indent="-171450" algn="l" defTabSz="685800" rtl="0" eaLnBrk="1" latinLnBrk="1" hangingPunct="1">
+      <a:lvl5pPr marL="1700853" indent="-188984" algn="l" defTabSz="755934" rtl="0" eaLnBrk="1" latinLnBrk="1" hangingPunct="1">
         <a:lnSpc>
           <a:spcPct val="90000"/>
         </a:lnSpc>
         <a:spcBef>
-          <a:spcPts val="375"/>
+          <a:spcPts val="413"/>
         </a:spcBef>
         <a:buFont typeface="Arial" panose="020B0604020202020204" pitchFamily="34" charset="0"/>
         <a:buChar char="•"/>
-        <a:defRPr sz="1350" kern="1200">
+        <a:defRPr sz="1488" kern="1200">
           <a:solidFill>
             <a:schemeClr val="tx1"/>
           </a:solidFill>
@@ -2777,16 +2782,16 @@
           <a:cs typeface="+mn-cs"/>
         </a:defRPr>
       </a:lvl5pPr>
-      <a:lvl6pPr marL="1885950" indent="-171450" algn="l" defTabSz="685800" rtl="0" eaLnBrk="1" latinLnBrk="1" hangingPunct="1">
+      <a:lvl6pPr marL="2078820" indent="-188984" algn="l" defTabSz="755934" rtl="0" eaLnBrk="1" latinLnBrk="1" hangingPunct="1">
         <a:lnSpc>
           <a:spcPct val="90000"/>
         </a:lnSpc>
         <a:spcBef>
-          <a:spcPts val="375"/>
+          <a:spcPts val="413"/>
         </a:spcBef>
         <a:buFont typeface="Arial" panose="020B0604020202020204" pitchFamily="34" charset="0"/>
         <a:buChar char="•"/>
-        <a:defRPr sz="1350" kern="1200">
+        <a:defRPr sz="1488" kern="1200">
           <a:solidFill>
             <a:schemeClr val="tx1"/>
           </a:solidFill>
@@ -2795,16 +2800,16 @@
           <a:cs typeface="+mn-cs"/>
         </a:defRPr>
       </a:lvl6pPr>
-      <a:lvl7pPr marL="2228850" indent="-171450" algn="l" defTabSz="685800" rtl="0" eaLnBrk="1" latinLnBrk="1" hangingPunct="1">
+      <a:lvl7pPr marL="2456787" indent="-188984" algn="l" defTabSz="755934" rtl="0" eaLnBrk="1" latinLnBrk="1" hangingPunct="1">
         <a:lnSpc>
           <a:spcPct val="90000"/>
         </a:lnSpc>
         <a:spcBef>
-          <a:spcPts val="375"/>
+          <a:spcPts val="413"/>
         </a:spcBef>
         <a:buFont typeface="Arial" panose="020B0604020202020204" pitchFamily="34" charset="0"/>
         <a:buChar char="•"/>
-        <a:defRPr sz="1350" kern="1200">
+        <a:defRPr sz="1488" kern="1200">
           <a:solidFill>
             <a:schemeClr val="tx1"/>
           </a:solidFill>
@@ -2813,16 +2818,16 @@
           <a:cs typeface="+mn-cs"/>
         </a:defRPr>
       </a:lvl7pPr>
-      <a:lvl8pPr marL="2571750" indent="-171450" algn="l" defTabSz="685800" rtl="0" eaLnBrk="1" latinLnBrk="1" hangingPunct="1">
+      <a:lvl8pPr marL="2834754" indent="-188984" algn="l" defTabSz="755934" rtl="0" eaLnBrk="1" latinLnBrk="1" hangingPunct="1">
         <a:lnSpc>
           <a:spcPct val="90000"/>
         </a:lnSpc>
         <a:spcBef>
-          <a:spcPts val="375"/>
+          <a:spcPts val="413"/>
         </a:spcBef>
         <a:buFont typeface="Arial" panose="020B0604020202020204" pitchFamily="34" charset="0"/>
         <a:buChar char="•"/>
-        <a:defRPr sz="1350" kern="1200">
+        <a:defRPr sz="1488" kern="1200">
           <a:solidFill>
             <a:schemeClr val="tx1"/>
           </a:solidFill>
@@ -2831,16 +2836,16 @@
           <a:cs typeface="+mn-cs"/>
         </a:defRPr>
       </a:lvl8pPr>
-      <a:lvl9pPr marL="2914650" indent="-171450" algn="l" defTabSz="685800" rtl="0" eaLnBrk="1" latinLnBrk="1" hangingPunct="1">
+      <a:lvl9pPr marL="3212722" indent="-188984" algn="l" defTabSz="755934" rtl="0" eaLnBrk="1" latinLnBrk="1" hangingPunct="1">
         <a:lnSpc>
           <a:spcPct val="90000"/>
         </a:lnSpc>
         <a:spcBef>
-          <a:spcPts val="375"/>
+          <a:spcPts val="413"/>
         </a:spcBef>
         <a:buFont typeface="Arial" panose="020B0604020202020204" pitchFamily="34" charset="0"/>
         <a:buChar char="•"/>
-        <a:defRPr sz="1350" kern="1200">
+        <a:defRPr sz="1488" kern="1200">
           <a:solidFill>
             <a:schemeClr val="tx1"/>
           </a:solidFill>
@@ -2854,8 +2859,8 @@
       <a:defPPr>
         <a:defRPr lang="en-US"/>
       </a:defPPr>
-      <a:lvl1pPr marL="0" algn="l" defTabSz="685800" rtl="0" eaLnBrk="1" latinLnBrk="1" hangingPunct="1">
-        <a:defRPr sz="1350" kern="1200">
+      <a:lvl1pPr marL="0" algn="l" defTabSz="755934" rtl="0" eaLnBrk="1" latinLnBrk="1" hangingPunct="1">
+        <a:defRPr sz="1488" kern="1200">
           <a:solidFill>
             <a:schemeClr val="tx1"/>
           </a:solidFill>
@@ -2864,8 +2869,8 @@
           <a:cs typeface="+mn-cs"/>
         </a:defRPr>
       </a:lvl1pPr>
-      <a:lvl2pPr marL="342900" algn="l" defTabSz="685800" rtl="0" eaLnBrk="1" latinLnBrk="1" hangingPunct="1">
-        <a:defRPr sz="1350" kern="1200">
+      <a:lvl2pPr marL="377967" algn="l" defTabSz="755934" rtl="0" eaLnBrk="1" latinLnBrk="1" hangingPunct="1">
+        <a:defRPr sz="1488" kern="1200">
           <a:solidFill>
             <a:schemeClr val="tx1"/>
           </a:solidFill>
@@ -2874,8 +2879,8 @@
           <a:cs typeface="+mn-cs"/>
         </a:defRPr>
       </a:lvl2pPr>
-      <a:lvl3pPr marL="685800" algn="l" defTabSz="685800" rtl="0" eaLnBrk="1" latinLnBrk="1" hangingPunct="1">
-        <a:defRPr sz="1350" kern="1200">
+      <a:lvl3pPr marL="755934" algn="l" defTabSz="755934" rtl="0" eaLnBrk="1" latinLnBrk="1" hangingPunct="1">
+        <a:defRPr sz="1488" kern="1200">
           <a:solidFill>
             <a:schemeClr val="tx1"/>
           </a:solidFill>
@@ -2884,8 +2889,8 @@
           <a:cs typeface="+mn-cs"/>
         </a:defRPr>
       </a:lvl3pPr>
-      <a:lvl4pPr marL="1028700" algn="l" defTabSz="685800" rtl="0" eaLnBrk="1" latinLnBrk="1" hangingPunct="1">
-        <a:defRPr sz="1350" kern="1200">
+      <a:lvl4pPr marL="1133902" algn="l" defTabSz="755934" rtl="0" eaLnBrk="1" latinLnBrk="1" hangingPunct="1">
+        <a:defRPr sz="1488" kern="1200">
           <a:solidFill>
             <a:schemeClr val="tx1"/>
           </a:solidFill>
@@ -2894,8 +2899,8 @@
           <a:cs typeface="+mn-cs"/>
         </a:defRPr>
       </a:lvl4pPr>
-      <a:lvl5pPr marL="1371600" algn="l" defTabSz="685800" rtl="0" eaLnBrk="1" latinLnBrk="1" hangingPunct="1">
-        <a:defRPr sz="1350" kern="1200">
+      <a:lvl5pPr marL="1511869" algn="l" defTabSz="755934" rtl="0" eaLnBrk="1" latinLnBrk="1" hangingPunct="1">
+        <a:defRPr sz="1488" kern="1200">
           <a:solidFill>
             <a:schemeClr val="tx1"/>
           </a:solidFill>
@@ -2904,8 +2909,8 @@
           <a:cs typeface="+mn-cs"/>
         </a:defRPr>
       </a:lvl5pPr>
-      <a:lvl6pPr marL="1714500" algn="l" defTabSz="685800" rtl="0" eaLnBrk="1" latinLnBrk="1" hangingPunct="1">
-        <a:defRPr sz="1350" kern="1200">
+      <a:lvl6pPr marL="1889836" algn="l" defTabSz="755934" rtl="0" eaLnBrk="1" latinLnBrk="1" hangingPunct="1">
+        <a:defRPr sz="1488" kern="1200">
           <a:solidFill>
             <a:schemeClr val="tx1"/>
           </a:solidFill>
@@ -2914,8 +2919,8 @@
           <a:cs typeface="+mn-cs"/>
         </a:defRPr>
       </a:lvl6pPr>
-      <a:lvl7pPr marL="2057400" algn="l" defTabSz="685800" rtl="0" eaLnBrk="1" latinLnBrk="1" hangingPunct="1">
-        <a:defRPr sz="1350" kern="1200">
+      <a:lvl7pPr marL="2267803" algn="l" defTabSz="755934" rtl="0" eaLnBrk="1" latinLnBrk="1" hangingPunct="1">
+        <a:defRPr sz="1488" kern="1200">
           <a:solidFill>
             <a:schemeClr val="tx1"/>
           </a:solidFill>
@@ -2924,8 +2929,8 @@
           <a:cs typeface="+mn-cs"/>
         </a:defRPr>
       </a:lvl7pPr>
-      <a:lvl8pPr marL="2400300" algn="l" defTabSz="685800" rtl="0" eaLnBrk="1" latinLnBrk="1" hangingPunct="1">
-        <a:defRPr sz="1350" kern="1200">
+      <a:lvl8pPr marL="2645771" algn="l" defTabSz="755934" rtl="0" eaLnBrk="1" latinLnBrk="1" hangingPunct="1">
+        <a:defRPr sz="1488" kern="1200">
           <a:solidFill>
             <a:schemeClr val="tx1"/>
           </a:solidFill>
@@ -2934,8 +2939,8 @@
           <a:cs typeface="+mn-cs"/>
         </a:defRPr>
       </a:lvl8pPr>
-      <a:lvl9pPr marL="2743200" algn="l" defTabSz="685800" rtl="0" eaLnBrk="1" latinLnBrk="1" hangingPunct="1">
-        <a:defRPr sz="1350" kern="1200">
+      <a:lvl9pPr marL="3023738" algn="l" defTabSz="755934" rtl="0" eaLnBrk="1" latinLnBrk="1" hangingPunct="1">
+        <a:defRPr sz="1488" kern="1200">
           <a:solidFill>
             <a:schemeClr val="tx1"/>
           </a:solidFill>
@@ -2980,7 +2985,7 @@
         </p:nvSpPr>
         <p:spPr>
           <a:xfrm>
-            <a:off x="509666" y="634965"/>
+            <a:off x="40685" y="587667"/>
             <a:ext cx="599606" cy="449704"/>
           </a:xfrm>
           <a:prstGeom prst="roundRect">
@@ -3032,7 +3037,7 @@
         </p:nvSpPr>
         <p:spPr>
           <a:xfrm>
-            <a:off x="3129197" y="634965"/>
+            <a:off x="2660216" y="587667"/>
             <a:ext cx="599606" cy="449704"/>
           </a:xfrm>
           <a:prstGeom prst="roundRect">
@@ -3084,7 +3089,7 @@
         </p:nvSpPr>
         <p:spPr>
           <a:xfrm>
-            <a:off x="5748728" y="635822"/>
+            <a:off x="5279747" y="588524"/>
             <a:ext cx="599606" cy="449704"/>
           </a:xfrm>
           <a:prstGeom prst="roundRect">
@@ -3141,7 +3146,7 @@
         </p:nvCxnSpPr>
         <p:spPr>
           <a:xfrm>
-            <a:off x="1109274" y="859816"/>
+            <a:off x="640294" y="812518"/>
             <a:ext cx="2019925" cy="0"/>
           </a:xfrm>
           <a:prstGeom prst="straightConnector1">
@@ -3186,7 +3191,7 @@
         </p:nvCxnSpPr>
         <p:spPr>
           <a:xfrm>
-            <a:off x="3728805" y="859818"/>
+            <a:off x="3259825" y="812521"/>
             <a:ext cx="2019925" cy="857"/>
           </a:xfrm>
           <a:prstGeom prst="straightConnector1">
@@ -3231,7 +3236,7 @@
         </p:nvCxnSpPr>
         <p:spPr>
           <a:xfrm flipH="1" flipV="1">
-            <a:off x="3429002" y="634964"/>
+            <a:off x="2960022" y="587666"/>
             <a:ext cx="299803" cy="224852"/>
           </a:xfrm>
           <a:prstGeom prst="curvedConnector4">
@@ -3276,7 +3281,7 @@
         </p:nvSpPr>
         <p:spPr>
           <a:xfrm>
-            <a:off x="2240501" y="565755"/>
+            <a:off x="1771521" y="518458"/>
             <a:ext cx="864339" cy="276999"/>
           </a:xfrm>
           <a:prstGeom prst="rect">
@@ -3316,7 +3321,7 @@
         </p:nvSpPr>
         <p:spPr>
           <a:xfrm>
-            <a:off x="3148357" y="100763"/>
+            <a:off x="2679377" y="53466"/>
             <a:ext cx="864339" cy="276999"/>
           </a:xfrm>
           <a:prstGeom prst="rect">
@@ -3356,7 +3361,7 @@
         </p:nvSpPr>
         <p:spPr>
           <a:xfrm>
-            <a:off x="4384012" y="585931"/>
+            <a:off x="3915032" y="538634"/>
             <a:ext cx="779381" cy="276999"/>
           </a:xfrm>
           <a:prstGeom prst="rect">
@@ -3396,7 +3401,7 @@
         </p:nvSpPr>
         <p:spPr>
           <a:xfrm>
-            <a:off x="3148355" y="1566724"/>
+            <a:off x="2679374" y="1519426"/>
             <a:ext cx="599606" cy="449704"/>
           </a:xfrm>
           <a:prstGeom prst="roundRect">
@@ -3452,7 +3457,7 @@
         </p:nvCxnSpPr>
         <p:spPr>
           <a:xfrm rot="16200000" flipH="1">
-            <a:off x="1625458" y="268679"/>
+            <a:off x="1156477" y="221381"/>
             <a:ext cx="706908" cy="2338886"/>
           </a:xfrm>
           <a:prstGeom prst="curvedConnector2">
@@ -3494,7 +3499,7 @@
         </p:nvSpPr>
         <p:spPr>
           <a:xfrm>
-            <a:off x="5748728" y="1566724"/>
+            <a:off x="5279747" y="1519426"/>
             <a:ext cx="599606" cy="449704"/>
           </a:xfrm>
           <a:prstGeom prst="roundRect">
@@ -3548,7 +3553,7 @@
         </p:nvSpPr>
         <p:spPr>
           <a:xfrm>
-            <a:off x="3150492" y="2132329"/>
+            <a:off x="2681511" y="2085031"/>
             <a:ext cx="599606" cy="449704"/>
           </a:xfrm>
           <a:prstGeom prst="roundRect">
@@ -3606,7 +3611,7 @@
         </p:nvCxnSpPr>
         <p:spPr>
           <a:xfrm rot="16200000" flipH="1">
-            <a:off x="1343724" y="550413"/>
+            <a:off x="874743" y="503116"/>
             <a:ext cx="1272512" cy="2341023"/>
           </a:xfrm>
           <a:prstGeom prst="curvedConnector2">
@@ -3648,7 +3653,7 @@
         </p:nvSpPr>
         <p:spPr>
           <a:xfrm>
-            <a:off x="3145603" y="2725953"/>
+            <a:off x="2676622" y="2678655"/>
             <a:ext cx="599606" cy="449704"/>
           </a:xfrm>
           <a:prstGeom prst="roundRect">
@@ -3702,7 +3707,7 @@
         </p:nvSpPr>
         <p:spPr>
           <a:xfrm>
-            <a:off x="3152629" y="3322586"/>
+            <a:off x="2683648" y="3275288"/>
             <a:ext cx="599606" cy="449704"/>
           </a:xfrm>
           <a:prstGeom prst="roundRect">
@@ -3756,7 +3761,7 @@
         </p:nvSpPr>
         <p:spPr>
           <a:xfrm>
-            <a:off x="3127765" y="3920756"/>
+            <a:off x="2658785" y="3873458"/>
             <a:ext cx="1195153" cy="449704"/>
           </a:xfrm>
           <a:prstGeom prst="roundRect">
@@ -3812,7 +3817,7 @@
         </p:nvCxnSpPr>
         <p:spPr>
           <a:xfrm rot="16200000" flipH="1">
-            <a:off x="1044468" y="849670"/>
+            <a:off x="575487" y="802372"/>
             <a:ext cx="1866136" cy="2336134"/>
           </a:xfrm>
           <a:prstGeom prst="curvedConnector2">
@@ -3858,7 +3863,7 @@
         </p:nvCxnSpPr>
         <p:spPr>
           <a:xfrm rot="16200000" flipH="1">
-            <a:off x="749665" y="1144473"/>
+            <a:off x="280685" y="1097175"/>
             <a:ext cx="2462769" cy="2343160"/>
           </a:xfrm>
           <a:prstGeom prst="curvedConnector2">
@@ -3904,7 +3909,7 @@
         </p:nvCxnSpPr>
         <p:spPr>
           <a:xfrm rot="16200000" flipH="1">
-            <a:off x="438148" y="1455990"/>
+            <a:off x="-30832" y="1408692"/>
             <a:ext cx="3060939" cy="2318296"/>
           </a:xfrm>
           <a:prstGeom prst="curvedConnector2">
@@ -3950,7 +3955,7 @@
         </p:nvCxnSpPr>
         <p:spPr>
           <a:xfrm>
-            <a:off x="3747963" y="1791576"/>
+            <a:off x="3278983" y="1744278"/>
             <a:ext cx="2000767" cy="0"/>
           </a:xfrm>
           <a:prstGeom prst="straightConnector1">
@@ -3996,7 +4001,7 @@
         </p:nvCxnSpPr>
         <p:spPr>
           <a:xfrm flipH="1" flipV="1">
-            <a:off x="3448160" y="1566724"/>
+            <a:off x="2979180" y="1519426"/>
             <a:ext cx="299803" cy="224852"/>
           </a:xfrm>
           <a:prstGeom prst="curvedConnector4">
@@ -4041,7 +4046,7 @@
         </p:nvSpPr>
         <p:spPr>
           <a:xfrm>
-            <a:off x="2240501" y="1527725"/>
+            <a:off x="1771521" y="1480428"/>
             <a:ext cx="864339" cy="276999"/>
           </a:xfrm>
           <a:prstGeom prst="rect">
@@ -4081,7 +4086,7 @@
         </p:nvSpPr>
         <p:spPr>
           <a:xfrm>
-            <a:off x="3148357" y="1062733"/>
+            <a:off x="2679377" y="1015436"/>
             <a:ext cx="864339" cy="276999"/>
           </a:xfrm>
           <a:prstGeom prst="rect">
@@ -4121,7 +4126,7 @@
         </p:nvSpPr>
         <p:spPr>
           <a:xfrm>
-            <a:off x="5723970" y="3920756"/>
+            <a:off x="5254989" y="3873458"/>
             <a:ext cx="599606" cy="449704"/>
           </a:xfrm>
           <a:prstGeom prst="roundRect">
@@ -4175,7 +4180,7 @@
         </p:nvSpPr>
         <p:spPr>
           <a:xfrm>
-            <a:off x="4925568" y="4748393"/>
+            <a:off x="4456588" y="4701095"/>
             <a:ext cx="862501" cy="449704"/>
           </a:xfrm>
           <a:prstGeom prst="roundRect">
@@ -4227,7 +4232,7 @@
         </p:nvSpPr>
         <p:spPr>
           <a:xfrm>
-            <a:off x="4925567" y="5566505"/>
+            <a:off x="4456587" y="5519207"/>
             <a:ext cx="862501" cy="449704"/>
           </a:xfrm>
           <a:prstGeom prst="roundRect">
@@ -4279,7 +4284,7 @@
         </p:nvSpPr>
         <p:spPr>
           <a:xfrm>
-            <a:off x="4759240" y="6384618"/>
+            <a:off x="4290260" y="6337320"/>
             <a:ext cx="1195153" cy="449704"/>
           </a:xfrm>
           <a:prstGeom prst="roundRect">
@@ -4337,7 +4342,7 @@
         </p:nvCxnSpPr>
         <p:spPr>
           <a:xfrm>
-            <a:off x="4322916" y="4145607"/>
+            <a:off x="3853935" y="4098309"/>
             <a:ext cx="1401054" cy="0"/>
           </a:xfrm>
           <a:prstGeom prst="straightConnector1">
@@ -4379,7 +4384,7 @@
         </p:nvSpPr>
         <p:spPr>
           <a:xfrm>
-            <a:off x="4384012" y="1512324"/>
+            <a:off x="3915032" y="1465027"/>
             <a:ext cx="779381" cy="276999"/>
           </a:xfrm>
           <a:prstGeom prst="rect">
@@ -4419,7 +4424,7 @@
         </p:nvSpPr>
         <p:spPr>
           <a:xfrm>
-            <a:off x="4633754" y="3868610"/>
+            <a:off x="4164774" y="3821313"/>
             <a:ext cx="779381" cy="276999"/>
           </a:xfrm>
           <a:prstGeom prst="rect">
@@ -4463,7 +4468,7 @@
         </p:nvCxnSpPr>
         <p:spPr>
           <a:xfrm>
-            <a:off x="4322917" y="4145607"/>
+            <a:off x="3853937" y="4098309"/>
             <a:ext cx="1033901" cy="602786"/>
           </a:xfrm>
           <a:prstGeom prst="curvedConnector2">
@@ -4505,7 +4510,7 @@
         </p:nvCxnSpPr>
         <p:spPr>
           <a:xfrm flipH="1">
-            <a:off x="5356818" y="5198097"/>
+            <a:off x="4887838" y="5150799"/>
             <a:ext cx="1" cy="368408"/>
           </a:xfrm>
           <a:prstGeom prst="straightConnector1">
@@ -4547,7 +4552,7 @@
         </p:nvCxnSpPr>
         <p:spPr>
           <a:xfrm flipH="1">
-            <a:off x="5356817" y="6016209"/>
+            <a:off x="4887837" y="5968911"/>
             <a:ext cx="1" cy="368408"/>
           </a:xfrm>
           <a:prstGeom prst="straightConnector1">
@@ -4586,7 +4591,7 @@
         </p:nvSpPr>
         <p:spPr>
           <a:xfrm>
-            <a:off x="4930145" y="4484973"/>
+            <a:off x="4461164" y="4437676"/>
             <a:ext cx="439544" cy="276999"/>
           </a:xfrm>
           <a:prstGeom prst="rect">
@@ -4626,7 +4631,7 @@
         </p:nvSpPr>
         <p:spPr>
           <a:xfrm>
-            <a:off x="4955711" y="5296643"/>
+            <a:off x="4486730" y="5249346"/>
             <a:ext cx="439544" cy="276999"/>
           </a:xfrm>
           <a:prstGeom prst="rect">
@@ -4666,7 +4671,7 @@
         </p:nvSpPr>
         <p:spPr>
           <a:xfrm>
-            <a:off x="4955711" y="6126253"/>
+            <a:off x="4486730" y="6078956"/>
             <a:ext cx="439544" cy="276999"/>
           </a:xfrm>
           <a:prstGeom prst="rect">
@@ -4709,7 +4714,7 @@
         </p:nvCxnSpPr>
         <p:spPr>
           <a:xfrm rot="5400000" flipH="1" flipV="1">
-            <a:off x="5460016" y="4870046"/>
+            <a:off x="4991035" y="4822748"/>
             <a:ext cx="224852" cy="431250"/>
           </a:xfrm>
           <a:prstGeom prst="curvedConnector4">
@@ -4755,7 +4760,7 @@
         </p:nvCxnSpPr>
         <p:spPr>
           <a:xfrm rot="10800000" flipH="1">
-            <a:off x="4925566" y="4973245"/>
+            <a:off x="4456586" y="4925947"/>
             <a:ext cx="1" cy="818112"/>
           </a:xfrm>
           <a:prstGeom prst="curvedConnector3">
@@ -4796,7 +4801,7 @@
         </p:nvSpPr>
         <p:spPr>
           <a:xfrm>
-            <a:off x="5987652" y="5084999"/>
+            <a:off x="5518672" y="5037702"/>
             <a:ext cx="779381" cy="276999"/>
           </a:xfrm>
           <a:prstGeom prst="rect">
@@ -4836,7 +4841,7 @@
         </p:nvSpPr>
         <p:spPr>
           <a:xfrm>
-            <a:off x="3930558" y="5194828"/>
+            <a:off x="3461578" y="5147531"/>
             <a:ext cx="779381" cy="276999"/>
           </a:xfrm>
           <a:prstGeom prst="rect">
@@ -4876,7 +4881,7 @@
         </p:nvSpPr>
         <p:spPr>
           <a:xfrm>
-            <a:off x="3148280" y="7029916"/>
+            <a:off x="2679300" y="6982618"/>
             <a:ext cx="812119" cy="449704"/>
           </a:xfrm>
           <a:prstGeom prst="roundRect">
@@ -4928,7 +4933,7 @@
         </p:nvSpPr>
         <p:spPr>
           <a:xfrm>
-            <a:off x="5753811" y="7030747"/>
+            <a:off x="5284830" y="6983449"/>
             <a:ext cx="599606" cy="449704"/>
           </a:xfrm>
           <a:prstGeom prst="roundRect">
@@ -4986,7 +4991,7 @@
         </p:nvCxnSpPr>
         <p:spPr>
           <a:xfrm rot="16200000" flipH="1">
-            <a:off x="-1106175" y="3000312"/>
+            <a:off x="-1575156" y="2953015"/>
             <a:ext cx="6170099" cy="2338811"/>
           </a:xfrm>
           <a:prstGeom prst="curvedConnector2">
@@ -5028,7 +5033,7 @@
         </p:nvSpPr>
         <p:spPr>
           <a:xfrm>
-            <a:off x="4955278" y="6977878"/>
+            <a:off x="4486298" y="6930581"/>
             <a:ext cx="779381" cy="276999"/>
           </a:xfrm>
           <a:prstGeom prst="rect">
@@ -5072,7 +5077,7 @@
         </p:nvCxnSpPr>
         <p:spPr>
           <a:xfrm>
-            <a:off x="3960397" y="7254767"/>
+            <a:off x="3491416" y="7207469"/>
             <a:ext cx="1793414" cy="832"/>
           </a:xfrm>
           <a:prstGeom prst="straightConnector1">
@@ -5114,7 +5119,7 @@
         </p:nvSpPr>
         <p:spPr>
           <a:xfrm>
-            <a:off x="5748728" y="7526850"/>
+            <a:off x="5279747" y="7479552"/>
             <a:ext cx="599606" cy="449704"/>
           </a:xfrm>
           <a:prstGeom prst="roundRect">
@@ -5172,7 +5177,7 @@
         </p:nvCxnSpPr>
         <p:spPr>
           <a:xfrm rot="16200000" flipH="1">
-            <a:off x="4515493" y="6518467"/>
+            <a:off x="4046512" y="6471169"/>
             <a:ext cx="272082" cy="2194388"/>
           </a:xfrm>
           <a:prstGeom prst="curvedConnector2">
@@ -5211,7 +5216,7 @@
         </p:nvSpPr>
         <p:spPr>
           <a:xfrm>
-            <a:off x="5210153" y="7486152"/>
+            <a:off x="4741172" y="7438855"/>
             <a:ext cx="269626" cy="276999"/>
           </a:xfrm>
           <a:prstGeom prst="rect">
@@ -5251,7 +5256,7 @@
         </p:nvSpPr>
         <p:spPr>
           <a:xfrm>
-            <a:off x="3148280" y="8219524"/>
+            <a:off x="2679300" y="8172226"/>
             <a:ext cx="812119" cy="449704"/>
           </a:xfrm>
           <a:prstGeom prst="roundRect">
@@ -5303,7 +5308,7 @@
         </p:nvSpPr>
         <p:spPr>
           <a:xfrm>
-            <a:off x="5753811" y="8220356"/>
+            <a:off x="5284830" y="8173058"/>
             <a:ext cx="599606" cy="449704"/>
           </a:xfrm>
           <a:prstGeom prst="roundRect">
@@ -5357,7 +5362,7 @@
         </p:nvSpPr>
         <p:spPr>
           <a:xfrm>
-            <a:off x="4955278" y="8167487"/>
+            <a:off x="4486298" y="8120190"/>
             <a:ext cx="779381" cy="276999"/>
           </a:xfrm>
           <a:prstGeom prst="rect">
@@ -5401,7 +5406,7 @@
         </p:nvCxnSpPr>
         <p:spPr>
           <a:xfrm>
-            <a:off x="3960397" y="8444376"/>
+            <a:off x="3491416" y="8397078"/>
             <a:ext cx="1793414" cy="832"/>
           </a:xfrm>
           <a:prstGeom prst="straightConnector1">
@@ -5443,7 +5448,7 @@
         </p:nvSpPr>
         <p:spPr>
           <a:xfrm>
-            <a:off x="5748728" y="8716460"/>
+            <a:off x="5279747" y="8669162"/>
             <a:ext cx="599606" cy="449704"/>
           </a:xfrm>
           <a:prstGeom prst="roundRect">
@@ -5501,7 +5506,7 @@
         </p:nvCxnSpPr>
         <p:spPr>
           <a:xfrm rot="16200000" flipH="1">
-            <a:off x="4515492" y="7708076"/>
+            <a:off x="4046511" y="7660778"/>
             <a:ext cx="272084" cy="2194388"/>
           </a:xfrm>
           <a:prstGeom prst="curvedConnector2">
@@ -5540,7 +5545,7 @@
         </p:nvSpPr>
         <p:spPr>
           <a:xfrm>
-            <a:off x="5210153" y="8675761"/>
+            <a:off x="4741172" y="8628464"/>
             <a:ext cx="269626" cy="276999"/>
           </a:xfrm>
           <a:prstGeom prst="rect">
@@ -5584,7 +5589,7 @@
         </p:nvCxnSpPr>
         <p:spPr>
           <a:xfrm rot="16200000" flipH="1">
-            <a:off x="-1700979" y="3595116"/>
+            <a:off x="-2169960" y="3547819"/>
             <a:ext cx="7359707" cy="2338811"/>
           </a:xfrm>
           <a:prstGeom prst="curvedConnector2">
@@ -5626,7 +5631,7 @@
         </p:nvSpPr>
         <p:spPr>
           <a:xfrm>
-            <a:off x="3148280" y="9409129"/>
+            <a:off x="2679300" y="9361831"/>
             <a:ext cx="1052245" cy="449704"/>
           </a:xfrm>
           <a:prstGeom prst="roundRect">
@@ -5678,7 +5683,7 @@
         </p:nvSpPr>
         <p:spPr>
           <a:xfrm>
-            <a:off x="5753811" y="9409961"/>
+            <a:off x="5284830" y="9362663"/>
             <a:ext cx="599606" cy="449704"/>
           </a:xfrm>
           <a:prstGeom prst="roundRect">
@@ -5732,7 +5737,7 @@
         </p:nvSpPr>
         <p:spPr>
           <a:xfrm>
-            <a:off x="4955278" y="9357092"/>
+            <a:off x="4486298" y="9309795"/>
             <a:ext cx="779381" cy="276999"/>
           </a:xfrm>
           <a:prstGeom prst="rect">
@@ -5776,7 +5781,7 @@
         </p:nvCxnSpPr>
         <p:spPr>
           <a:xfrm>
-            <a:off x="4200525" y="9633981"/>
+            <a:off x="3731544" y="9586683"/>
             <a:ext cx="1553286" cy="832"/>
           </a:xfrm>
           <a:prstGeom prst="straightConnector1">
@@ -5818,7 +5823,7 @@
         </p:nvSpPr>
         <p:spPr>
           <a:xfrm>
-            <a:off x="5748728" y="9906065"/>
+            <a:off x="5279747" y="9858767"/>
             <a:ext cx="599606" cy="449704"/>
           </a:xfrm>
           <a:prstGeom prst="roundRect">
@@ -5876,7 +5881,7 @@
         </p:nvCxnSpPr>
         <p:spPr>
           <a:xfrm rot="16200000" flipH="1">
-            <a:off x="4575523" y="8957712"/>
+            <a:off x="4106542" y="8910415"/>
             <a:ext cx="272084" cy="2074325"/>
           </a:xfrm>
           <a:prstGeom prst="curvedConnector2">
@@ -5915,7 +5920,7 @@
         </p:nvSpPr>
         <p:spPr>
           <a:xfrm>
-            <a:off x="5210153" y="9865366"/>
+            <a:off x="4741172" y="9818069"/>
             <a:ext cx="269626" cy="276999"/>
           </a:xfrm>
           <a:prstGeom prst="rect">
@@ -5955,7 +5960,7 @@
         </p:nvSpPr>
         <p:spPr>
           <a:xfrm>
-            <a:off x="5744970" y="10583975"/>
+            <a:off x="5275989" y="10536677"/>
             <a:ext cx="599606" cy="449704"/>
           </a:xfrm>
           <a:prstGeom prst="roundRect">
@@ -6013,7 +6018,7 @@
         </p:nvCxnSpPr>
         <p:spPr>
           <a:xfrm>
-            <a:off x="3745209" y="10808827"/>
+            <a:off x="3276229" y="10761529"/>
             <a:ext cx="1999761" cy="0"/>
           </a:xfrm>
           <a:prstGeom prst="straightConnector1">
@@ -6055,7 +6060,7 @@
         </p:nvSpPr>
         <p:spPr>
           <a:xfrm>
-            <a:off x="3145603" y="10583975"/>
+            <a:off x="2676622" y="10536677"/>
             <a:ext cx="599606" cy="449704"/>
           </a:xfrm>
           <a:prstGeom prst="roundRect">
@@ -6107,7 +6112,7 @@
         </p:nvSpPr>
         <p:spPr>
           <a:xfrm>
-            <a:off x="5210153" y="10583975"/>
+            <a:off x="4741172" y="10536678"/>
             <a:ext cx="269626" cy="276999"/>
           </a:xfrm>
           <a:prstGeom prst="rect">
@@ -6147,7 +6152,7 @@
         </p:nvSpPr>
         <p:spPr>
           <a:xfrm>
-            <a:off x="3164778" y="11259017"/>
+            <a:off x="2695797" y="11211719"/>
             <a:ext cx="599606" cy="449704"/>
           </a:xfrm>
           <a:prstGeom prst="roundRect">
@@ -6201,7 +6206,7 @@
         </p:nvSpPr>
         <p:spPr>
           <a:xfrm>
-            <a:off x="3159695" y="11755121"/>
+            <a:off x="2690714" y="11707823"/>
             <a:ext cx="599606" cy="449704"/>
           </a:xfrm>
           <a:prstGeom prst="roundRect">
@@ -6255,7 +6260,7 @@
         </p:nvSpPr>
         <p:spPr>
           <a:xfrm>
-            <a:off x="1793875" y="11259017"/>
+            <a:off x="1324894" y="11211719"/>
             <a:ext cx="599606" cy="449704"/>
           </a:xfrm>
           <a:prstGeom prst="roundRect">
@@ -6309,7 +6314,7 @@
         </p:nvSpPr>
         <p:spPr>
           <a:xfrm>
-            <a:off x="1788791" y="11755121"/>
+            <a:off x="1319811" y="11707823"/>
             <a:ext cx="670767" cy="449704"/>
           </a:xfrm>
           <a:prstGeom prst="roundRect">
@@ -6366,7 +6371,7 @@
         </p:nvCxnSpPr>
         <p:spPr>
           <a:xfrm>
-            <a:off x="2661220" y="11483869"/>
+            <a:off x="2192239" y="11436571"/>
             <a:ext cx="503558" cy="0"/>
           </a:xfrm>
           <a:prstGeom prst="straightConnector1">
@@ -6408,7 +6413,7 @@
         </p:nvCxnSpPr>
         <p:spPr>
           <a:xfrm>
-            <a:off x="2661220" y="11977496"/>
+            <a:off x="2192240" y="11930199"/>
             <a:ext cx="498475" cy="2477"/>
           </a:xfrm>
           <a:prstGeom prst="straightConnector1">
@@ -6447,7 +6452,7 @@
         </p:nvSpPr>
         <p:spPr>
           <a:xfrm>
-            <a:off x="5739742" y="11259017"/>
+            <a:off x="5270761" y="11211719"/>
             <a:ext cx="599606" cy="449704"/>
           </a:xfrm>
           <a:prstGeom prst="roundRect">
@@ -6501,7 +6506,7 @@
         </p:nvSpPr>
         <p:spPr>
           <a:xfrm>
-            <a:off x="5734659" y="11755121"/>
+            <a:off x="5265678" y="11707823"/>
             <a:ext cx="599606" cy="449704"/>
           </a:xfrm>
           <a:prstGeom prst="roundRect">
@@ -6558,7 +6563,7 @@
         </p:nvCxnSpPr>
         <p:spPr>
           <a:xfrm>
-            <a:off x="5236184" y="11483869"/>
+            <a:off x="4767203" y="11436571"/>
             <a:ext cx="503558" cy="0"/>
           </a:xfrm>
           <a:prstGeom prst="straightConnector1">
@@ -6600,7 +6605,7 @@
         </p:nvCxnSpPr>
         <p:spPr>
           <a:xfrm>
-            <a:off x="5236184" y="11977496"/>
+            <a:off x="4767204" y="11930199"/>
             <a:ext cx="498475" cy="2477"/>
           </a:xfrm>
           <a:prstGeom prst="straightConnector1">
@@ -6639,7 +6644,7 @@
         </p:nvSpPr>
         <p:spPr>
           <a:xfrm>
-            <a:off x="4461230" y="11259017"/>
+            <a:off x="3992249" y="11211719"/>
             <a:ext cx="599606" cy="449704"/>
           </a:xfrm>
           <a:prstGeom prst="roundRect">
@@ -6693,7 +6698,7 @@
         </p:nvSpPr>
         <p:spPr>
           <a:xfrm>
-            <a:off x="4456147" y="11755121"/>
+            <a:off x="3987166" y="11707823"/>
             <a:ext cx="599606" cy="449704"/>
           </a:xfrm>
           <a:prstGeom prst="roundRect">
@@ -6750,7 +6755,7 @@
         </p:nvCxnSpPr>
         <p:spPr>
           <a:xfrm>
-            <a:off x="3957672" y="11483869"/>
+            <a:off x="3488691" y="11436571"/>
             <a:ext cx="503558" cy="0"/>
           </a:xfrm>
           <a:prstGeom prst="straightConnector1">
@@ -6792,7 +6797,7 @@
         </p:nvCxnSpPr>
         <p:spPr>
           <a:xfrm>
-            <a:off x="3957672" y="11977496"/>
+            <a:off x="3488692" y="11930199"/>
             <a:ext cx="498475" cy="2477"/>
           </a:xfrm>
           <a:prstGeom prst="straightConnector1">
@@ -6831,7 +6836,7 @@
         </p:nvSpPr>
         <p:spPr>
           <a:xfrm>
-            <a:off x="1390380" y="11221717"/>
+            <a:off x="921399" y="11174420"/>
             <a:ext cx="269626" cy="276999"/>
           </a:xfrm>
           <a:prstGeom prst="rect">
@@ -6871,7 +6876,7 @@
         </p:nvSpPr>
         <p:spPr>
           <a:xfrm>
-            <a:off x="1390380" y="11700497"/>
+            <a:off x="921399" y="11653200"/>
             <a:ext cx="269626" cy="276999"/>
           </a:xfrm>
           <a:prstGeom prst="rect">
@@ -6911,7 +6916,7 @@
         </p:nvSpPr>
         <p:spPr>
           <a:xfrm>
-            <a:off x="2763391" y="11229941"/>
+            <a:off x="2294410" y="11182644"/>
             <a:ext cx="269626" cy="276999"/>
           </a:xfrm>
           <a:prstGeom prst="rect">
@@ -6951,7 +6956,7 @@
         </p:nvSpPr>
         <p:spPr>
           <a:xfrm>
-            <a:off x="2763391" y="11708721"/>
+            <a:off x="2294410" y="11661424"/>
             <a:ext cx="269626" cy="276999"/>
           </a:xfrm>
           <a:prstGeom prst="rect">
@@ -6991,7 +6996,7 @@
         </p:nvSpPr>
         <p:spPr>
           <a:xfrm>
-            <a:off x="4065712" y="11221717"/>
+            <a:off x="3596731" y="11174420"/>
             <a:ext cx="269626" cy="276999"/>
           </a:xfrm>
           <a:prstGeom prst="rect">
@@ -7031,7 +7036,7 @@
         </p:nvSpPr>
         <p:spPr>
           <a:xfrm>
-            <a:off x="4065712" y="11700497"/>
+            <a:off x="3596731" y="11653200"/>
             <a:ext cx="269626" cy="276999"/>
           </a:xfrm>
           <a:prstGeom prst="rect">
@@ -7071,7 +7076,7 @@
         </p:nvSpPr>
         <p:spPr>
           <a:xfrm>
-            <a:off x="5332807" y="11221717"/>
+            <a:off x="4863826" y="11174420"/>
             <a:ext cx="269626" cy="276999"/>
           </a:xfrm>
           <a:prstGeom prst="rect">
@@ -7111,7 +7116,7 @@
         </p:nvSpPr>
         <p:spPr>
           <a:xfrm>
-            <a:off x="5332807" y="11700497"/>
+            <a:off x="4863826" y="11653200"/>
             <a:ext cx="269626" cy="276999"/>
           </a:xfrm>
           <a:prstGeom prst="rect">
@@ -7154,7 +7159,7 @@
         </p:nvCxnSpPr>
         <p:spPr>
           <a:xfrm flipH="1" flipV="1">
-            <a:off x="809469" y="634965"/>
+            <a:off x="340489" y="587667"/>
             <a:ext cx="299803" cy="224852"/>
           </a:xfrm>
           <a:prstGeom prst="curvedConnector4">
@@ -7196,7 +7201,7 @@
         </p:nvSpPr>
         <p:spPr>
           <a:xfrm>
-            <a:off x="584345" y="97525"/>
+            <a:off x="115364" y="50228"/>
             <a:ext cx="1204176" cy="276999"/>
           </a:xfrm>
           <a:prstGeom prst="rect">
@@ -7236,7 +7241,7 @@
         </p:nvSpPr>
         <p:spPr>
           <a:xfrm>
-            <a:off x="2775644" y="2126068"/>
+            <a:off x="2306663" y="2078771"/>
             <a:ext cx="269626" cy="276999"/>
           </a:xfrm>
           <a:prstGeom prst="rect">
@@ -7276,7 +7281,7 @@
         </p:nvSpPr>
         <p:spPr>
           <a:xfrm>
-            <a:off x="2777184" y="2722876"/>
+            <a:off x="2308203" y="2675579"/>
             <a:ext cx="269626" cy="276999"/>
           </a:xfrm>
           <a:prstGeom prst="rect">
@@ -7316,7 +7321,7 @@
         </p:nvSpPr>
         <p:spPr>
           <a:xfrm>
-            <a:off x="2775644" y="3268650"/>
+            <a:off x="2306663" y="3221353"/>
             <a:ext cx="269626" cy="276999"/>
           </a:xfrm>
           <a:prstGeom prst="rect">
@@ -7356,7 +7361,7 @@
         </p:nvSpPr>
         <p:spPr>
           <a:xfrm>
-            <a:off x="2775644" y="3877705"/>
+            <a:off x="2306663" y="3830408"/>
             <a:ext cx="269626" cy="276999"/>
           </a:xfrm>
           <a:prstGeom prst="rect">
@@ -7396,7 +7401,7 @@
         </p:nvSpPr>
         <p:spPr>
           <a:xfrm>
-            <a:off x="2775644" y="6954506"/>
+            <a:off x="2306663" y="6907209"/>
             <a:ext cx="269626" cy="276999"/>
           </a:xfrm>
           <a:prstGeom prst="rect">
@@ -7436,7 +7441,7 @@
         </p:nvSpPr>
         <p:spPr>
           <a:xfrm>
-            <a:off x="2775644" y="8141302"/>
+            <a:off x="2306663" y="8094005"/>
             <a:ext cx="269626" cy="276999"/>
           </a:xfrm>
           <a:prstGeom prst="rect">
@@ -7476,7 +7481,7 @@
         </p:nvSpPr>
         <p:spPr>
           <a:xfrm>
-            <a:off x="2779711" y="9356982"/>
+            <a:off x="2310730" y="9309685"/>
             <a:ext cx="269626" cy="276999"/>
           </a:xfrm>
           <a:prstGeom prst="rect">
@@ -7516,7 +7521,7 @@
         </p:nvSpPr>
         <p:spPr>
           <a:xfrm>
-            <a:off x="2776670" y="10528277"/>
+            <a:off x="2307689" y="10480980"/>
             <a:ext cx="269626" cy="276999"/>
           </a:xfrm>
           <a:prstGeom prst="rect">
@@ -7560,7 +7565,7 @@
         </p:nvCxnSpPr>
         <p:spPr>
           <a:xfrm rot="16200000" flipH="1">
-            <a:off x="-2295782" y="4189919"/>
+            <a:off x="-2764763" y="4142622"/>
             <a:ext cx="8549312" cy="2338811"/>
           </a:xfrm>
           <a:prstGeom prst="curvedConnector2">
@@ -7606,7 +7611,7 @@
         </p:nvCxnSpPr>
         <p:spPr>
           <a:xfrm rot="16200000" flipH="1">
-            <a:off x="-2884543" y="4778681"/>
+            <a:off x="-3353524" y="4731383"/>
             <a:ext cx="9724158" cy="2336134"/>
           </a:xfrm>
           <a:prstGeom prst="curvedConnector2">
@@ -7652,7 +7657,7 @@
         </p:nvCxnSpPr>
         <p:spPr>
           <a:xfrm rot="16200000" flipH="1">
-            <a:off x="-4148522" y="6042660"/>
+            <a:off x="-4617503" y="5995362"/>
             <a:ext cx="10895304" cy="979322"/>
           </a:xfrm>
           <a:prstGeom prst="bentConnector2">
@@ -7695,7 +7700,7 @@
         </p:nvCxnSpPr>
         <p:spPr>
           <a:xfrm rot="16200000" flipH="1">
-            <a:off x="-3897928" y="5792066"/>
+            <a:off x="-4366909" y="5744768"/>
             <a:ext cx="10399200" cy="984406"/>
           </a:xfrm>
           <a:prstGeom prst="bentConnector2">
@@ -7720,6 +7725,61 @@
           </a:fontRef>
         </p:style>
       </p:cxnSp>
+      <p:sp>
+        <p:nvSpPr>
+          <p:cNvPr id="2" name="TextBox 1">
+            <a:extLst>
+              <a:ext uri="{FF2B5EF4-FFF2-40B4-BE49-F238E27FC236}">
+                <a16:creationId xmlns:a16="http://schemas.microsoft.com/office/drawing/2014/main" id="{69860EED-D273-4B88-96CA-8D1E4E19068A}"/>
+              </a:ext>
+            </a:extLst>
+          </p:cNvPr>
+          <p:cNvSpPr txBox="1"/>
+          <p:nvPr/>
+        </p:nvSpPr>
+        <p:spPr>
+          <a:xfrm>
+            <a:off x="3778110" y="2580225"/>
+            <a:ext cx="2087174" cy="646331"/>
+          </a:xfrm>
+          <a:prstGeom prst="rect">
+            <a:avLst/>
+          </a:prstGeom>
+        </p:spPr>
+        <p:style>
+          <a:lnRef idx="2">
+            <a:schemeClr val="accent6"/>
+          </a:lnRef>
+          <a:fillRef idx="1">
+            <a:schemeClr val="lt1"/>
+          </a:fillRef>
+          <a:effectRef idx="0">
+            <a:schemeClr val="accent6"/>
+          </a:effectRef>
+          <a:fontRef idx="minor">
+            <a:schemeClr val="dk1"/>
+          </a:fontRef>
+        </p:style>
+        <p:txBody>
+          <a:bodyPr wrap="none" rtlCol="0">
+            <a:spAutoFit/>
+          </a:bodyPr>
+          <a:lstStyle/>
+          <a:p>
+            <a:r>
+              <a:rPr lang="en-US" altLang="ko-KR" dirty="0"/>
+              <a:t>[ … ] : Look ahead</a:t>
+            </a:r>
+          </a:p>
+          <a:p>
+            <a:r>
+              <a:rPr lang="en-US" altLang="ko-KR" dirty="0"/>
+              <a:t>&lt; … &gt; : Discard input</a:t>
+            </a:r>
+            <a:endParaRPr lang="ko-KR" altLang="en-US" dirty="0"/>
+          </a:p>
+        </p:txBody>
+      </p:sp>
     </p:spTree>
     <p:extLst>
       <p:ext uri="{BB962C8B-B14F-4D97-AF65-F5344CB8AC3E}">

</xml_diff>